<commit_message>
Vue / ajax update
</commit_message>
<xml_diff>
--- a/교육/3주차_TCP_IP와 AJAX.pptx
+++ b/교육/3주차_TCP_IP와 AJAX.pptx
@@ -8,15 +8,17 @@
     <p:sldId id="257" r:id="rId2"/>
     <p:sldId id="265" r:id="rId3"/>
     <p:sldId id="267" r:id="rId4"/>
-    <p:sldId id="258" r:id="rId5"/>
-    <p:sldId id="268" r:id="rId6"/>
-    <p:sldId id="278" r:id="rId7"/>
-    <p:sldId id="269" r:id="rId8"/>
-    <p:sldId id="274" r:id="rId9"/>
-    <p:sldId id="270" r:id="rId10"/>
-    <p:sldId id="273" r:id="rId11"/>
-    <p:sldId id="277" r:id="rId12"/>
-    <p:sldId id="279" r:id="rId13"/>
+    <p:sldId id="281" r:id="rId5"/>
+    <p:sldId id="258" r:id="rId6"/>
+    <p:sldId id="268" r:id="rId7"/>
+    <p:sldId id="278" r:id="rId8"/>
+    <p:sldId id="269" r:id="rId9"/>
+    <p:sldId id="274" r:id="rId10"/>
+    <p:sldId id="270" r:id="rId11"/>
+    <p:sldId id="273" r:id="rId12"/>
+    <p:sldId id="280" r:id="rId13"/>
+    <p:sldId id="277" r:id="rId14"/>
+    <p:sldId id="279" r:id="rId15"/>
   </p:sldIdLst>
   <p:sldSz cx="12192000" cy="6858000"/>
   <p:notesSz cx="6858000" cy="9144000"/>
@@ -277,7 +279,7 @@
                 </a:solidFill>
               </a:rPr>
               <a:pPr/>
-              <a:t>2020-10-21</a:t>
+              <a:t>2020-10-22</a:t>
             </a:fld>
             <a:endParaRPr lang="ko-KR" altLang="en-US">
               <a:solidFill>
@@ -507,7 +509,7 @@
                 </a:solidFill>
               </a:rPr>
               <a:pPr/>
-              <a:t>2020-10-21</a:t>
+              <a:t>2020-10-22</a:t>
             </a:fld>
             <a:endParaRPr lang="ko-KR" altLang="en-US">
               <a:solidFill>
@@ -747,7 +749,7 @@
                 </a:solidFill>
               </a:rPr>
               <a:pPr/>
-              <a:t>2020-10-21</a:t>
+              <a:t>2020-10-22</a:t>
             </a:fld>
             <a:endParaRPr lang="ko-KR" altLang="en-US">
               <a:solidFill>
@@ -977,7 +979,7 @@
                 </a:solidFill>
               </a:rPr>
               <a:pPr/>
-              <a:t>2020-10-21</a:t>
+              <a:t>2020-10-22</a:t>
             </a:fld>
             <a:endParaRPr lang="ko-KR" altLang="en-US">
               <a:solidFill>
@@ -1284,7 +1286,7 @@
                 </a:solidFill>
               </a:rPr>
               <a:pPr/>
-              <a:t>2020-10-21</a:t>
+              <a:t>2020-10-22</a:t>
             </a:fld>
             <a:endParaRPr lang="ko-KR" altLang="en-US">
               <a:solidFill>
@@ -1581,7 +1583,7 @@
                 </a:solidFill>
               </a:rPr>
               <a:pPr/>
-              <a:t>2020-10-21</a:t>
+              <a:t>2020-10-22</a:t>
             </a:fld>
             <a:endParaRPr lang="ko-KR" altLang="en-US">
               <a:solidFill>
@@ -2025,7 +2027,7 @@
                 </a:solidFill>
               </a:rPr>
               <a:pPr/>
-              <a:t>2020-10-21</a:t>
+              <a:t>2020-10-22</a:t>
             </a:fld>
             <a:endParaRPr lang="ko-KR" altLang="en-US">
               <a:solidFill>
@@ -2198,7 +2200,7 @@
                 </a:solidFill>
               </a:rPr>
               <a:pPr/>
-              <a:t>2020-10-21</a:t>
+              <a:t>2020-10-22</a:t>
             </a:fld>
             <a:endParaRPr lang="ko-KR" altLang="en-US">
               <a:solidFill>
@@ -2343,7 +2345,7 @@
                 </a:solidFill>
               </a:rPr>
               <a:pPr/>
-              <a:t>2020-10-21</a:t>
+              <a:t>2020-10-22</a:t>
             </a:fld>
             <a:endParaRPr lang="ko-KR" altLang="en-US">
               <a:solidFill>
@@ -2686,7 +2688,7 @@
                 </a:solidFill>
               </a:rPr>
               <a:pPr/>
-              <a:t>2020-10-21</a:t>
+              <a:t>2020-10-22</a:t>
             </a:fld>
             <a:endParaRPr lang="ko-KR" altLang="en-US">
               <a:solidFill>
@@ -3006,7 +3008,7 @@
                 </a:solidFill>
               </a:rPr>
               <a:pPr/>
-              <a:t>2020-10-21</a:t>
+              <a:t>2020-10-22</a:t>
             </a:fld>
             <a:endParaRPr lang="ko-KR" altLang="en-US">
               <a:solidFill>
@@ -3279,7 +3281,7 @@
                 </a:solidFill>
               </a:rPr>
               <a:pPr/>
-              <a:t>2020-10-21</a:t>
+              <a:t>2020-10-22</a:t>
             </a:fld>
             <a:endParaRPr lang="ko-KR" altLang="en-US">
               <a:solidFill>
@@ -4449,6 +4451,854 @@
       </p:grpSpPr>
       <p:sp>
         <p:nvSpPr>
+          <p:cNvPr id="12" name="사각형: 잘린 대각선 방향 모서리 11">
+            <a:extLst>
+              <a:ext uri="{FF2B5EF4-FFF2-40B4-BE49-F238E27FC236}">
+                <a16:creationId xmlns:a16="http://schemas.microsoft.com/office/drawing/2014/main" id="{E785BA1E-6CAA-4578-BD5D-D0A9DAD338DF}"/>
+              </a:ext>
+            </a:extLst>
+          </p:cNvPr>
+          <p:cNvSpPr/>
+          <p:nvPr/>
+        </p:nvSpPr>
+        <p:spPr>
+          <a:xfrm>
+            <a:off x="6761527" y="1556976"/>
+            <a:ext cx="5019413" cy="4679740"/>
+          </a:xfrm>
+          <a:prstGeom prst="snip2DiagRect">
+            <a:avLst>
+              <a:gd name="adj1" fmla="val 0"/>
+              <a:gd name="adj2" fmla="val 13442"/>
+            </a:avLst>
+          </a:prstGeom>
+          <a:solidFill>
+            <a:schemeClr val="bg1"/>
+          </a:solidFill>
+          <a:ln w="19050">
+            <a:solidFill>
+              <a:srgbClr val="214867"/>
+            </a:solidFill>
+          </a:ln>
+        </p:spPr>
+        <p:style>
+          <a:lnRef idx="2">
+            <a:schemeClr val="accent1">
+              <a:shade val="50000"/>
+            </a:schemeClr>
+          </a:lnRef>
+          <a:fillRef idx="1">
+            <a:schemeClr val="accent1"/>
+          </a:fillRef>
+          <a:effectRef idx="0">
+            <a:schemeClr val="accent1"/>
+          </a:effectRef>
+          <a:fontRef idx="minor">
+            <a:schemeClr val="lt1"/>
+          </a:fontRef>
+        </p:style>
+        <p:txBody>
+          <a:bodyPr rtlCol="0" anchor="ctr"/>
+          <a:lstStyle/>
+          <a:p>
+            <a:pPr algn="ctr"/>
+            <a:endParaRPr lang="ko-KR" altLang="en-US">
+              <a:solidFill>
+                <a:prstClr val="white"/>
+              </a:solidFill>
+            </a:endParaRPr>
+          </a:p>
+        </p:txBody>
+      </p:sp>
+      <p:sp>
+        <p:nvSpPr>
+          <p:cNvPr id="14" name="직사각형 13">
+            <a:extLst>
+              <a:ext uri="{FF2B5EF4-FFF2-40B4-BE49-F238E27FC236}">
+                <a16:creationId xmlns:a16="http://schemas.microsoft.com/office/drawing/2014/main" id="{06C33F71-FFC7-4C90-8A7A-F04FBE1B9F8D}"/>
+              </a:ext>
+            </a:extLst>
+          </p:cNvPr>
+          <p:cNvSpPr/>
+          <p:nvPr/>
+        </p:nvSpPr>
+        <p:spPr>
+          <a:xfrm>
+            <a:off x="0" y="-3"/>
+            <a:ext cx="12192000" cy="1081193"/>
+          </a:xfrm>
+          <a:prstGeom prst="rect">
+            <a:avLst/>
+          </a:prstGeom>
+          <a:solidFill>
+            <a:srgbClr val="214867"/>
+          </a:solidFill>
+          <a:ln>
+            <a:noFill/>
+          </a:ln>
+        </p:spPr>
+        <p:style>
+          <a:lnRef idx="2">
+            <a:schemeClr val="accent1">
+              <a:shade val="50000"/>
+            </a:schemeClr>
+          </a:lnRef>
+          <a:fillRef idx="1">
+            <a:schemeClr val="accent1"/>
+          </a:fillRef>
+          <a:effectRef idx="0">
+            <a:schemeClr val="accent1"/>
+          </a:effectRef>
+          <a:fontRef idx="minor">
+            <a:schemeClr val="lt1"/>
+          </a:fontRef>
+        </p:style>
+        <p:txBody>
+          <a:bodyPr rtlCol="0" anchor="t"/>
+          <a:lstStyle/>
+          <a:p>
+            <a:pPr algn="ctr" latinLnBrk="0">
+              <a:lnSpc>
+                <a:spcPct val="150000"/>
+              </a:lnSpc>
+              <a:defRPr/>
+            </a:pPr>
+            <a:r>
+              <a:rPr lang="en-US" altLang="ko-KR" sz="3200" b="1" i="1" kern="0" dirty="0">
+                <a:solidFill>
+                  <a:prstClr val="white"/>
+                </a:solidFill>
+              </a:rPr>
+              <a:t>Git</a:t>
+            </a:r>
+            <a:r>
+              <a:rPr lang="ko-KR" altLang="en-US" sz="3200" b="1" i="1" kern="0" dirty="0">
+                <a:solidFill>
+                  <a:prstClr val="white"/>
+                </a:solidFill>
+              </a:rPr>
+              <a:t>의 구조</a:t>
+            </a:r>
+            <a:r>
+              <a:rPr lang="en-US" altLang="ko-KR" sz="3200" b="1" i="1" kern="0" dirty="0">
+                <a:solidFill>
+                  <a:prstClr val="white"/>
+                </a:solidFill>
+              </a:rPr>
+              <a:t> </a:t>
+            </a:r>
+          </a:p>
+          <a:p>
+            <a:pPr algn="ctr" latinLnBrk="0">
+              <a:defRPr/>
+            </a:pPr>
+            <a:r>
+              <a:rPr lang="ko-KR" altLang="en-US" sz="900" kern="0" dirty="0">
+                <a:solidFill>
+                  <a:prstClr val="white"/>
+                </a:solidFill>
+              </a:rPr>
+              <a:t>형상 관리 도구</a:t>
+            </a:r>
+            <a:endParaRPr lang="en-US" altLang="ko-KR" sz="900" kern="0" dirty="0">
+              <a:solidFill>
+                <a:prstClr val="white"/>
+              </a:solidFill>
+            </a:endParaRPr>
+          </a:p>
+        </p:txBody>
+      </p:sp>
+      <p:grpSp>
+        <p:nvGrpSpPr>
+          <p:cNvPr id="15" name="그룹 14">
+            <a:extLst>
+              <a:ext uri="{FF2B5EF4-FFF2-40B4-BE49-F238E27FC236}">
+                <a16:creationId xmlns:a16="http://schemas.microsoft.com/office/drawing/2014/main" id="{01B88480-A456-4CDB-9ECA-BAC3ADFE90DA}"/>
+              </a:ext>
+            </a:extLst>
+          </p:cNvPr>
+          <p:cNvGrpSpPr/>
+          <p:nvPr/>
+        </p:nvGrpSpPr>
+        <p:grpSpPr>
+          <a:xfrm>
+            <a:off x="10027920" y="-3"/>
+            <a:ext cx="2164081" cy="1082041"/>
+            <a:chOff x="9919316" y="4585314"/>
+            <a:chExt cx="2272685" cy="1136343"/>
+          </a:xfrm>
+        </p:grpSpPr>
+        <p:sp>
+          <p:nvSpPr>
+            <p:cNvPr id="16" name="직각 삼각형 15">
+              <a:extLst>
+                <a:ext uri="{FF2B5EF4-FFF2-40B4-BE49-F238E27FC236}">
+                  <a16:creationId xmlns:a16="http://schemas.microsoft.com/office/drawing/2014/main" id="{55D11947-7A5F-49A1-B4CE-9BD12303E946}"/>
+                </a:ext>
+              </a:extLst>
+            </p:cNvPr>
+            <p:cNvSpPr/>
+            <p:nvPr/>
+          </p:nvSpPr>
+          <p:spPr>
+            <a:xfrm rot="5400000">
+              <a:off x="11055659" y="4585314"/>
+              <a:ext cx="1136342" cy="1136342"/>
+            </a:xfrm>
+            <a:prstGeom prst="rtTriangle">
+              <a:avLst/>
+            </a:prstGeom>
+            <a:solidFill>
+              <a:schemeClr val="bg1"/>
+            </a:solidFill>
+            <a:ln>
+              <a:noFill/>
+            </a:ln>
+          </p:spPr>
+          <p:style>
+            <a:lnRef idx="2">
+              <a:schemeClr val="accent1">
+                <a:shade val="50000"/>
+              </a:schemeClr>
+            </a:lnRef>
+            <a:fillRef idx="1">
+              <a:schemeClr val="accent1"/>
+            </a:fillRef>
+            <a:effectRef idx="0">
+              <a:schemeClr val="accent1"/>
+            </a:effectRef>
+            <a:fontRef idx="minor">
+              <a:schemeClr val="lt1"/>
+            </a:fontRef>
+          </p:style>
+          <p:txBody>
+            <a:bodyPr rtlCol="0" anchor="ctr"/>
+            <a:lstStyle/>
+            <a:p>
+              <a:pPr algn="ctr"/>
+              <a:endParaRPr lang="ko-KR" altLang="en-US">
+                <a:solidFill>
+                  <a:prstClr val="white"/>
+                </a:solidFill>
+              </a:endParaRPr>
+            </a:p>
+          </p:txBody>
+        </p:sp>
+        <p:sp>
+          <p:nvSpPr>
+            <p:cNvPr id="17" name="직각 삼각형 16">
+              <a:extLst>
+                <a:ext uri="{FF2B5EF4-FFF2-40B4-BE49-F238E27FC236}">
+                  <a16:creationId xmlns:a16="http://schemas.microsoft.com/office/drawing/2014/main" id="{7F68E216-A0B8-43CF-8570-8BF98D9FC025}"/>
+                </a:ext>
+              </a:extLst>
+            </p:cNvPr>
+            <p:cNvSpPr/>
+            <p:nvPr/>
+          </p:nvSpPr>
+          <p:spPr>
+            <a:xfrm rot="16200000">
+              <a:off x="9919316" y="4585315"/>
+              <a:ext cx="1136342" cy="1136342"/>
+            </a:xfrm>
+            <a:prstGeom prst="rtTriangle">
+              <a:avLst/>
+            </a:prstGeom>
+            <a:solidFill>
+              <a:srgbClr val="00B0F0"/>
+            </a:solidFill>
+            <a:ln>
+              <a:noFill/>
+            </a:ln>
+          </p:spPr>
+          <p:style>
+            <a:lnRef idx="2">
+              <a:schemeClr val="accent1">
+                <a:shade val="50000"/>
+              </a:schemeClr>
+            </a:lnRef>
+            <a:fillRef idx="1">
+              <a:schemeClr val="accent1"/>
+            </a:fillRef>
+            <a:effectRef idx="0">
+              <a:schemeClr val="accent1"/>
+            </a:effectRef>
+            <a:fontRef idx="minor">
+              <a:schemeClr val="lt1"/>
+            </a:fontRef>
+          </p:style>
+          <p:txBody>
+            <a:bodyPr rtlCol="0" anchor="ctr"/>
+            <a:lstStyle/>
+            <a:p>
+              <a:pPr algn="ctr"/>
+              <a:endParaRPr lang="ko-KR" altLang="en-US">
+                <a:solidFill>
+                  <a:prstClr val="white"/>
+                </a:solidFill>
+              </a:endParaRPr>
+            </a:p>
+          </p:txBody>
+        </p:sp>
+      </p:grpSp>
+      <p:sp>
+        <p:nvSpPr>
+          <p:cNvPr id="2" name="사각형: 잘린 대각선 방향 모서리 1">
+            <a:extLst>
+              <a:ext uri="{FF2B5EF4-FFF2-40B4-BE49-F238E27FC236}">
+                <a16:creationId xmlns:a16="http://schemas.microsoft.com/office/drawing/2014/main" id="{C262272E-A083-482D-AAA4-84DB7FAAD480}"/>
+              </a:ext>
+            </a:extLst>
+          </p:cNvPr>
+          <p:cNvSpPr/>
+          <p:nvPr/>
+        </p:nvSpPr>
+        <p:spPr>
+          <a:xfrm>
+            <a:off x="410766" y="1556976"/>
+            <a:ext cx="6057146" cy="4679740"/>
+          </a:xfrm>
+          <a:prstGeom prst="snip2DiagRect">
+            <a:avLst>
+              <a:gd name="adj1" fmla="val 0"/>
+              <a:gd name="adj2" fmla="val 13442"/>
+            </a:avLst>
+          </a:prstGeom>
+          <a:solidFill>
+            <a:schemeClr val="bg1"/>
+          </a:solidFill>
+          <a:ln w="19050">
+            <a:solidFill>
+              <a:srgbClr val="214867"/>
+            </a:solidFill>
+          </a:ln>
+        </p:spPr>
+        <p:style>
+          <a:lnRef idx="2">
+            <a:schemeClr val="accent1">
+              <a:shade val="50000"/>
+            </a:schemeClr>
+          </a:lnRef>
+          <a:fillRef idx="1">
+            <a:schemeClr val="accent1"/>
+          </a:fillRef>
+          <a:effectRef idx="0">
+            <a:schemeClr val="accent1"/>
+          </a:effectRef>
+          <a:fontRef idx="minor">
+            <a:schemeClr val="lt1"/>
+          </a:fontRef>
+        </p:style>
+        <p:txBody>
+          <a:bodyPr rtlCol="0" anchor="ctr"/>
+          <a:lstStyle/>
+          <a:p>
+            <a:pPr algn="ctr"/>
+            <a:endParaRPr lang="ko-KR" altLang="en-US">
+              <a:solidFill>
+                <a:prstClr val="white"/>
+              </a:solidFill>
+            </a:endParaRPr>
+          </a:p>
+        </p:txBody>
+      </p:sp>
+      <p:sp>
+        <p:nvSpPr>
+          <p:cNvPr id="4" name="직각 삼각형 3">
+            <a:extLst>
+              <a:ext uri="{FF2B5EF4-FFF2-40B4-BE49-F238E27FC236}">
+                <a16:creationId xmlns:a16="http://schemas.microsoft.com/office/drawing/2014/main" id="{8A08EF92-D381-4F2F-99D7-D58A7A8699D6}"/>
+              </a:ext>
+            </a:extLst>
+          </p:cNvPr>
+          <p:cNvSpPr/>
+          <p:nvPr/>
+        </p:nvSpPr>
+        <p:spPr>
+          <a:xfrm rot="10800000">
+            <a:off x="5821960" y="1556976"/>
+            <a:ext cx="645952" cy="817108"/>
+          </a:xfrm>
+          <a:prstGeom prst="rtTriangle">
+            <a:avLst/>
+          </a:prstGeom>
+          <a:solidFill>
+            <a:srgbClr val="00B0F0"/>
+          </a:solidFill>
+          <a:ln w="19050">
+            <a:solidFill>
+              <a:srgbClr val="214867"/>
+            </a:solidFill>
+          </a:ln>
+        </p:spPr>
+        <p:style>
+          <a:lnRef idx="2">
+            <a:schemeClr val="accent1">
+              <a:shade val="50000"/>
+            </a:schemeClr>
+          </a:lnRef>
+          <a:fillRef idx="1">
+            <a:schemeClr val="accent1"/>
+          </a:fillRef>
+          <a:effectRef idx="0">
+            <a:schemeClr val="accent1"/>
+          </a:effectRef>
+          <a:fontRef idx="minor">
+            <a:schemeClr val="lt1"/>
+          </a:fontRef>
+        </p:style>
+        <p:txBody>
+          <a:bodyPr rtlCol="0" anchor="ctr"/>
+          <a:lstStyle/>
+          <a:p>
+            <a:pPr algn="ctr"/>
+            <a:endParaRPr lang="ko-KR" altLang="en-US">
+              <a:solidFill>
+                <a:prstClr val="white"/>
+              </a:solidFill>
+            </a:endParaRPr>
+          </a:p>
+        </p:txBody>
+      </p:sp>
+      <p:sp>
+        <p:nvSpPr>
+          <p:cNvPr id="5" name="직각 삼각형 4">
+            <a:extLst>
+              <a:ext uri="{FF2B5EF4-FFF2-40B4-BE49-F238E27FC236}">
+                <a16:creationId xmlns:a16="http://schemas.microsoft.com/office/drawing/2014/main" id="{DFDB318C-74DC-45F7-8C78-5BEE74037100}"/>
+              </a:ext>
+            </a:extLst>
+          </p:cNvPr>
+          <p:cNvSpPr/>
+          <p:nvPr/>
+        </p:nvSpPr>
+        <p:spPr>
+          <a:xfrm>
+            <a:off x="411060" y="5419608"/>
+            <a:ext cx="645952" cy="817108"/>
+          </a:xfrm>
+          <a:prstGeom prst="rtTriangle">
+            <a:avLst/>
+          </a:prstGeom>
+          <a:solidFill>
+            <a:srgbClr val="00B0F0"/>
+          </a:solidFill>
+          <a:ln w="19050">
+            <a:solidFill>
+              <a:srgbClr val="214867"/>
+            </a:solidFill>
+          </a:ln>
+        </p:spPr>
+        <p:style>
+          <a:lnRef idx="2">
+            <a:schemeClr val="accent1">
+              <a:shade val="50000"/>
+            </a:schemeClr>
+          </a:lnRef>
+          <a:fillRef idx="1">
+            <a:schemeClr val="accent1"/>
+          </a:fillRef>
+          <a:effectRef idx="0">
+            <a:schemeClr val="accent1"/>
+          </a:effectRef>
+          <a:fontRef idx="minor">
+            <a:schemeClr val="lt1"/>
+          </a:fontRef>
+        </p:style>
+        <p:txBody>
+          <a:bodyPr rtlCol="0" anchor="ctr"/>
+          <a:lstStyle/>
+          <a:p>
+            <a:pPr algn="ctr"/>
+            <a:endParaRPr lang="ko-KR" altLang="en-US">
+              <a:solidFill>
+                <a:prstClr val="white"/>
+              </a:solidFill>
+            </a:endParaRPr>
+          </a:p>
+        </p:txBody>
+      </p:sp>
+      <p:sp>
+        <p:nvSpPr>
+          <p:cNvPr id="6" name="직사각형 5">
+            <a:extLst>
+              <a:ext uri="{FF2B5EF4-FFF2-40B4-BE49-F238E27FC236}">
+                <a16:creationId xmlns:a16="http://schemas.microsoft.com/office/drawing/2014/main" id="{97FE9B2E-01A3-4F72-84C0-D6686CD3997B}"/>
+              </a:ext>
+            </a:extLst>
+          </p:cNvPr>
+          <p:cNvSpPr/>
+          <p:nvPr/>
+        </p:nvSpPr>
+        <p:spPr>
+          <a:xfrm>
+            <a:off x="931179" y="1745069"/>
+            <a:ext cx="5301842" cy="4303553"/>
+          </a:xfrm>
+          <a:prstGeom prst="rect">
+            <a:avLst/>
+          </a:prstGeom>
+          <a:noFill/>
+          <a:ln>
+            <a:noFill/>
+          </a:ln>
+        </p:spPr>
+        <p:style>
+          <a:lnRef idx="2">
+            <a:schemeClr val="accent1">
+              <a:shade val="50000"/>
+            </a:schemeClr>
+          </a:lnRef>
+          <a:fillRef idx="1">
+            <a:schemeClr val="accent1"/>
+          </a:fillRef>
+          <a:effectRef idx="0">
+            <a:schemeClr val="accent1"/>
+          </a:effectRef>
+          <a:fontRef idx="minor">
+            <a:schemeClr val="lt1"/>
+          </a:fontRef>
+        </p:style>
+        <p:txBody>
+          <a:bodyPr rtlCol="0" anchor="ctr"/>
+          <a:lstStyle/>
+          <a:p>
+            <a:pPr>
+              <a:lnSpc>
+                <a:spcPct val="150000"/>
+              </a:lnSpc>
+            </a:pPr>
+            <a:r>
+              <a:rPr lang="en-US" altLang="ko-KR" sz="2500" b="1" dirty="0">
+                <a:solidFill>
+                  <a:srgbClr val="00B0F0"/>
+                </a:solidFill>
+              </a:rPr>
+              <a:t>Git</a:t>
+            </a:r>
+            <a:r>
+              <a:rPr lang="ko-KR" altLang="en-US" sz="2000" b="1" dirty="0">
+                <a:solidFill>
+                  <a:srgbClr val="00B0F0"/>
+                </a:solidFill>
+              </a:rPr>
+              <a:t> 두개의 저장소</a:t>
+            </a:r>
+            <a:endParaRPr lang="en-US" altLang="ko-KR" sz="2000" b="1" dirty="0">
+              <a:solidFill>
+                <a:srgbClr val="00B0F0"/>
+              </a:solidFill>
+            </a:endParaRPr>
+          </a:p>
+          <a:p>
+            <a:pPr>
+              <a:lnSpc>
+                <a:spcPct val="150000"/>
+              </a:lnSpc>
+            </a:pPr>
+            <a:endParaRPr lang="en-US" altLang="ko-KR" sz="2000" dirty="0">
+              <a:solidFill>
+                <a:srgbClr val="78808D"/>
+              </a:solidFill>
+            </a:endParaRPr>
+          </a:p>
+          <a:p>
+            <a:pPr>
+              <a:lnSpc>
+                <a:spcPct val="150000"/>
+              </a:lnSpc>
+            </a:pPr>
+            <a:r>
+              <a:rPr lang="en-US" altLang="ko-KR" sz="1400" dirty="0">
+                <a:solidFill>
+                  <a:srgbClr val="78808D"/>
+                </a:solidFill>
+              </a:rPr>
+              <a:t>Git</a:t>
+            </a:r>
+            <a:r>
+              <a:rPr lang="ko-KR" altLang="en-US" sz="1400" dirty="0">
+                <a:solidFill>
+                  <a:srgbClr val="78808D"/>
+                </a:solidFill>
+              </a:rPr>
+              <a:t>의 저장소</a:t>
+            </a:r>
+            <a:r>
+              <a:rPr lang="en-US" altLang="ko-KR" sz="1400" dirty="0">
+                <a:solidFill>
+                  <a:srgbClr val="78808D"/>
+                </a:solidFill>
+              </a:rPr>
+              <a:t>(repository)</a:t>
+            </a:r>
+            <a:r>
+              <a:rPr lang="ko-KR" altLang="en-US" sz="1400" dirty="0">
+                <a:solidFill>
+                  <a:srgbClr val="78808D"/>
+                </a:solidFill>
+              </a:rPr>
+              <a:t>는 크게 </a:t>
+            </a:r>
+            <a:r>
+              <a:rPr lang="en-US" altLang="ko-KR" sz="1400" b="1" dirty="0">
+                <a:solidFill>
+                  <a:srgbClr val="78808D"/>
+                </a:solidFill>
+              </a:rPr>
+              <a:t>Local repositor</a:t>
+            </a:r>
+            <a:r>
+              <a:rPr lang="ko-KR" altLang="en-US" sz="1400" dirty="0">
+                <a:solidFill>
+                  <a:srgbClr val="78808D"/>
+                </a:solidFill>
+              </a:rPr>
+              <a:t>와</a:t>
+            </a:r>
+            <a:r>
+              <a:rPr lang="ko-KR" altLang="en-US" sz="1400" b="1" dirty="0">
+                <a:solidFill>
+                  <a:srgbClr val="78808D"/>
+                </a:solidFill>
+              </a:rPr>
+              <a:t> </a:t>
+            </a:r>
+            <a:endParaRPr lang="en-US" altLang="ko-KR" sz="1400" b="1" dirty="0">
+              <a:solidFill>
+                <a:srgbClr val="78808D"/>
+              </a:solidFill>
+            </a:endParaRPr>
+          </a:p>
+          <a:p>
+            <a:pPr>
+              <a:lnSpc>
+                <a:spcPct val="150000"/>
+              </a:lnSpc>
+            </a:pPr>
+            <a:r>
+              <a:rPr lang="en-US" altLang="ko-KR" sz="1400" b="1" dirty="0">
+                <a:solidFill>
+                  <a:srgbClr val="78808D"/>
+                </a:solidFill>
+              </a:rPr>
+              <a:t>Remote repositor</a:t>
+            </a:r>
+            <a:r>
+              <a:rPr lang="ko-KR" altLang="en-US" sz="1400" dirty="0">
+                <a:solidFill>
+                  <a:srgbClr val="78808D"/>
+                </a:solidFill>
+              </a:rPr>
+              <a:t>가 있다</a:t>
+            </a:r>
+            <a:endParaRPr lang="en-US" altLang="ko-KR" sz="1200" b="1" dirty="0">
+              <a:solidFill>
+                <a:srgbClr val="78808D"/>
+              </a:solidFill>
+            </a:endParaRPr>
+          </a:p>
+          <a:p>
+            <a:pPr>
+              <a:lnSpc>
+                <a:spcPct val="150000"/>
+              </a:lnSpc>
+            </a:pPr>
+            <a:endParaRPr lang="en-US" altLang="ko-KR" sz="1200" b="1" dirty="0">
+              <a:solidFill>
+                <a:srgbClr val="78808D"/>
+              </a:solidFill>
+            </a:endParaRPr>
+          </a:p>
+          <a:p>
+            <a:pPr marL="171450" indent="-171450">
+              <a:lnSpc>
+                <a:spcPct val="150000"/>
+              </a:lnSpc>
+              <a:buFont typeface="Arial" panose="020B0604020202020204" pitchFamily="34" charset="0"/>
+              <a:buChar char="•"/>
+            </a:pPr>
+            <a:r>
+              <a:rPr lang="en-US" altLang="ko-KR" sz="1200" dirty="0">
+                <a:solidFill>
+                  <a:srgbClr val="78808D"/>
+                </a:solidFill>
+              </a:rPr>
+              <a:t>Local repository : </a:t>
+            </a:r>
+            <a:r>
+              <a:rPr lang="ko-KR" altLang="en-US" sz="1200" dirty="0">
+                <a:solidFill>
+                  <a:srgbClr val="78808D"/>
+                </a:solidFill>
+              </a:rPr>
+              <a:t>개인 </a:t>
+            </a:r>
+            <a:r>
+              <a:rPr lang="en-US" altLang="ko-KR" sz="1200" dirty="0">
+                <a:solidFill>
+                  <a:srgbClr val="78808D"/>
+                </a:solidFill>
+              </a:rPr>
+              <a:t>PC</a:t>
+            </a:r>
+            <a:r>
+              <a:rPr lang="ko-KR" altLang="en-US" sz="1200" dirty="0">
+                <a:solidFill>
+                  <a:srgbClr val="78808D"/>
+                </a:solidFill>
+              </a:rPr>
+              <a:t>에 설정된 </a:t>
+            </a:r>
+            <a:r>
+              <a:rPr lang="en-US" altLang="ko-KR" sz="1200" dirty="0">
+                <a:solidFill>
+                  <a:srgbClr val="78808D"/>
+                </a:solidFill>
+              </a:rPr>
+              <a:t>Git repository</a:t>
+            </a:r>
+          </a:p>
+          <a:p>
+            <a:pPr>
+              <a:lnSpc>
+                <a:spcPct val="150000"/>
+              </a:lnSpc>
+            </a:pPr>
+            <a:endParaRPr lang="en-US" altLang="ko-KR" sz="1200" dirty="0">
+              <a:solidFill>
+                <a:srgbClr val="78808D"/>
+              </a:solidFill>
+            </a:endParaRPr>
+          </a:p>
+          <a:p>
+            <a:pPr marL="171450" indent="-171450">
+              <a:lnSpc>
+                <a:spcPct val="150000"/>
+              </a:lnSpc>
+              <a:buFont typeface="Arial" panose="020B0604020202020204" pitchFamily="34" charset="0"/>
+              <a:buChar char="•"/>
+            </a:pPr>
+            <a:r>
+              <a:rPr lang="en-US" altLang="ko-KR" sz="1200" dirty="0">
+                <a:solidFill>
+                  <a:srgbClr val="78808D"/>
+                </a:solidFill>
+              </a:rPr>
+              <a:t>Remote repository : remote repository</a:t>
+            </a:r>
+            <a:r>
+              <a:rPr lang="ko-KR" altLang="en-US" sz="1200" dirty="0">
+                <a:solidFill>
+                  <a:srgbClr val="78808D"/>
+                </a:solidFill>
+              </a:rPr>
+              <a:t>를 운용하는 서버에 있는 </a:t>
+            </a:r>
+            <a:r>
+              <a:rPr lang="en-US" altLang="ko-KR" sz="1200" dirty="0">
+                <a:solidFill>
+                  <a:srgbClr val="78808D"/>
+                </a:solidFill>
+              </a:rPr>
+              <a:t>Git repository</a:t>
+            </a:r>
+            <a:r>
+              <a:rPr lang="ko-KR" altLang="en-US" sz="1200" dirty="0">
+                <a:solidFill>
+                  <a:srgbClr val="78808D"/>
+                </a:solidFill>
+              </a:rPr>
+              <a:t>로 일종의 백업 클라우드 개념이다</a:t>
+            </a:r>
+            <a:endParaRPr lang="en-US" altLang="ko-KR" sz="1200" dirty="0">
+              <a:solidFill>
+                <a:srgbClr val="78808D"/>
+              </a:solidFill>
+            </a:endParaRPr>
+          </a:p>
+          <a:p>
+            <a:pPr>
+              <a:lnSpc>
+                <a:spcPct val="150000"/>
+              </a:lnSpc>
+            </a:pPr>
+            <a:endParaRPr lang="en-US" altLang="ko-KR" sz="1200" b="1" dirty="0">
+              <a:solidFill>
+                <a:srgbClr val="78808D"/>
+              </a:solidFill>
+            </a:endParaRPr>
+          </a:p>
+        </p:txBody>
+      </p:sp>
+      <p:pic>
+        <p:nvPicPr>
+          <p:cNvPr id="11" name="그림 10">
+            <a:extLst>
+              <a:ext uri="{FF2B5EF4-FFF2-40B4-BE49-F238E27FC236}">
+                <a16:creationId xmlns:a16="http://schemas.microsoft.com/office/drawing/2014/main" id="{5AE69E45-969B-460E-9DC7-C80CCFE2E24B}"/>
+              </a:ext>
+            </a:extLst>
+          </p:cNvPr>
+          <p:cNvPicPr>
+            <a:picLocks noChangeAspect="1"/>
+          </p:cNvPicPr>
+          <p:nvPr/>
+        </p:nvPicPr>
+        <p:blipFill>
+          <a:blip r:embed="rId2">
+            <a:extLst>
+              <a:ext uri="{28A0092B-C50C-407E-A947-70E740481C1C}">
+                <a14:useLocalDpi xmlns:a14="http://schemas.microsoft.com/office/drawing/2010/main" val="0"/>
+              </a:ext>
+            </a:extLst>
+          </a:blip>
+          <a:stretch>
+            <a:fillRect/>
+          </a:stretch>
+        </p:blipFill>
+        <p:spPr>
+          <a:xfrm>
+            <a:off x="6965962" y="2181660"/>
+            <a:ext cx="4610542" cy="3430369"/>
+          </a:xfrm>
+          <a:prstGeom prst="rect">
+            <a:avLst/>
+          </a:prstGeom>
+        </p:spPr>
+      </p:pic>
+    </p:spTree>
+    <p:extLst>
+      <p:ext uri="{BB962C8B-B14F-4D97-AF65-F5344CB8AC3E}">
+        <p14:creationId xmlns:p14="http://schemas.microsoft.com/office/powerpoint/2010/main" val="3245043748"/>
+      </p:ext>
+    </p:extLst>
+  </p:cSld>
+  <p:clrMapOvr>
+    <a:masterClrMapping/>
+  </p:clrMapOvr>
+</p:sld>
+</file>
+
+<file path=ppt/slides/slide11.xml><?xml version="1.0" encoding="utf-8"?>
+<p:sld xmlns:a="http://schemas.openxmlformats.org/drawingml/2006/main" xmlns:r="http://schemas.openxmlformats.org/officeDocument/2006/relationships" xmlns:p="http://schemas.openxmlformats.org/presentationml/2006/main">
+  <p:cSld>
+    <p:spTree>
+      <p:nvGrpSpPr>
+        <p:cNvPr id="1" name=""/>
+        <p:cNvGrpSpPr/>
+        <p:nvPr/>
+      </p:nvGrpSpPr>
+      <p:grpSpPr>
+        <a:xfrm>
+          <a:off x="0" y="0"/>
+          <a:ext cx="0" cy="0"/>
+          <a:chOff x="0" y="0"/>
+          <a:chExt cx="0" cy="0"/>
+        </a:xfrm>
+      </p:grpSpPr>
+      <p:sp>
+        <p:nvSpPr>
           <p:cNvPr id="14" name="직사각형 13">
             <a:extLst>
               <a:ext uri="{FF2B5EF4-FFF2-40B4-BE49-F238E27FC236}">
@@ -5481,7 +6331,839 @@
 </p:sld>
 </file>
 
-<file path=ppt/slides/slide11.xml><?xml version="1.0" encoding="utf-8"?>
+<file path=ppt/slides/slide12.xml><?xml version="1.0" encoding="utf-8"?>
+<p:sld xmlns:a="http://schemas.openxmlformats.org/drawingml/2006/main" xmlns:r="http://schemas.openxmlformats.org/officeDocument/2006/relationships" xmlns:p="http://schemas.openxmlformats.org/presentationml/2006/main">
+  <p:cSld>
+    <p:spTree>
+      <p:nvGrpSpPr>
+        <p:cNvPr id="1" name=""/>
+        <p:cNvGrpSpPr/>
+        <p:nvPr/>
+      </p:nvGrpSpPr>
+      <p:grpSpPr>
+        <a:xfrm>
+          <a:off x="0" y="0"/>
+          <a:ext cx="0" cy="0"/>
+          <a:chOff x="0" y="0"/>
+          <a:chExt cx="0" cy="0"/>
+        </a:xfrm>
+      </p:grpSpPr>
+      <p:sp>
+        <p:nvSpPr>
+          <p:cNvPr id="14" name="직사각형 13">
+            <a:extLst>
+              <a:ext uri="{FF2B5EF4-FFF2-40B4-BE49-F238E27FC236}">
+                <a16:creationId xmlns:a16="http://schemas.microsoft.com/office/drawing/2014/main" id="{06C33F71-FFC7-4C90-8A7A-F04FBE1B9F8D}"/>
+              </a:ext>
+            </a:extLst>
+          </p:cNvPr>
+          <p:cNvSpPr/>
+          <p:nvPr/>
+        </p:nvSpPr>
+        <p:spPr>
+          <a:xfrm>
+            <a:off x="0" y="-3"/>
+            <a:ext cx="12192000" cy="1081193"/>
+          </a:xfrm>
+          <a:prstGeom prst="rect">
+            <a:avLst/>
+          </a:prstGeom>
+          <a:solidFill>
+            <a:srgbClr val="214867"/>
+          </a:solidFill>
+          <a:ln>
+            <a:noFill/>
+          </a:ln>
+        </p:spPr>
+        <p:style>
+          <a:lnRef idx="2">
+            <a:schemeClr val="accent1">
+              <a:shade val="50000"/>
+            </a:schemeClr>
+          </a:lnRef>
+          <a:fillRef idx="1">
+            <a:schemeClr val="accent1"/>
+          </a:fillRef>
+          <a:effectRef idx="0">
+            <a:schemeClr val="accent1"/>
+          </a:effectRef>
+          <a:fontRef idx="minor">
+            <a:schemeClr val="lt1"/>
+          </a:fontRef>
+        </p:style>
+        <p:txBody>
+          <a:bodyPr rtlCol="0" anchor="t"/>
+          <a:lstStyle/>
+          <a:p>
+            <a:pPr algn="ctr" latinLnBrk="0">
+              <a:lnSpc>
+                <a:spcPct val="150000"/>
+              </a:lnSpc>
+              <a:defRPr/>
+            </a:pPr>
+            <a:r>
+              <a:rPr lang="en-US" altLang="ko-KR" sz="3200" b="1" i="1" kern="0" dirty="0">
+                <a:solidFill>
+                  <a:prstClr val="white"/>
+                </a:solidFill>
+              </a:rPr>
+              <a:t>Git</a:t>
+            </a:r>
+            <a:r>
+              <a:rPr lang="ko-KR" altLang="en-US" sz="3200" b="1" i="1" kern="0" dirty="0">
+                <a:solidFill>
+                  <a:prstClr val="white"/>
+                </a:solidFill>
+              </a:rPr>
+              <a:t>의 개념 및 명령어</a:t>
+            </a:r>
+            <a:endParaRPr lang="en-US" altLang="ko-KR" sz="3200" b="1" i="1" kern="0" dirty="0">
+              <a:solidFill>
+                <a:prstClr val="white"/>
+              </a:solidFill>
+            </a:endParaRPr>
+          </a:p>
+          <a:p>
+            <a:pPr algn="ctr" latinLnBrk="0">
+              <a:defRPr/>
+            </a:pPr>
+            <a:r>
+              <a:rPr lang="en-US" altLang="ko-KR" sz="900" dirty="0">
+                <a:solidFill>
+                  <a:schemeClr val="bg1"/>
+                </a:solidFill>
+              </a:rPr>
+              <a:t>Git</a:t>
+            </a:r>
+            <a:r>
+              <a:rPr lang="ko-KR" altLang="en-US" sz="900" dirty="0">
+                <a:solidFill>
+                  <a:schemeClr val="bg1"/>
+                </a:solidFill>
+              </a:rPr>
+              <a:t>을 사용한 개인 저장소 관리</a:t>
+            </a:r>
+            <a:r>
+              <a:rPr lang="en-US" altLang="ko-KR" sz="900" dirty="0">
+                <a:solidFill>
+                  <a:schemeClr val="bg1"/>
+                </a:solidFill>
+              </a:rPr>
+              <a:t>  </a:t>
+            </a:r>
+            <a:endParaRPr lang="ko-KR" altLang="en-US" sz="900" dirty="0">
+              <a:solidFill>
+                <a:schemeClr val="bg1"/>
+              </a:solidFill>
+            </a:endParaRPr>
+          </a:p>
+        </p:txBody>
+      </p:sp>
+      <p:grpSp>
+        <p:nvGrpSpPr>
+          <p:cNvPr id="15" name="그룹 14">
+            <a:extLst>
+              <a:ext uri="{FF2B5EF4-FFF2-40B4-BE49-F238E27FC236}">
+                <a16:creationId xmlns:a16="http://schemas.microsoft.com/office/drawing/2014/main" id="{01B88480-A456-4CDB-9ECA-BAC3ADFE90DA}"/>
+              </a:ext>
+            </a:extLst>
+          </p:cNvPr>
+          <p:cNvGrpSpPr/>
+          <p:nvPr/>
+        </p:nvGrpSpPr>
+        <p:grpSpPr>
+          <a:xfrm>
+            <a:off x="10027920" y="-3"/>
+            <a:ext cx="2164081" cy="1082041"/>
+            <a:chOff x="9919316" y="4585314"/>
+            <a:chExt cx="2272685" cy="1136343"/>
+          </a:xfrm>
+        </p:grpSpPr>
+        <p:sp>
+          <p:nvSpPr>
+            <p:cNvPr id="16" name="직각 삼각형 15">
+              <a:extLst>
+                <a:ext uri="{FF2B5EF4-FFF2-40B4-BE49-F238E27FC236}">
+                  <a16:creationId xmlns:a16="http://schemas.microsoft.com/office/drawing/2014/main" id="{55D11947-7A5F-49A1-B4CE-9BD12303E946}"/>
+                </a:ext>
+              </a:extLst>
+            </p:cNvPr>
+            <p:cNvSpPr/>
+            <p:nvPr/>
+          </p:nvSpPr>
+          <p:spPr>
+            <a:xfrm rot="5400000">
+              <a:off x="11055659" y="4585314"/>
+              <a:ext cx="1136342" cy="1136342"/>
+            </a:xfrm>
+            <a:prstGeom prst="rtTriangle">
+              <a:avLst/>
+            </a:prstGeom>
+            <a:solidFill>
+              <a:schemeClr val="bg1"/>
+            </a:solidFill>
+            <a:ln>
+              <a:noFill/>
+            </a:ln>
+          </p:spPr>
+          <p:style>
+            <a:lnRef idx="2">
+              <a:schemeClr val="accent1">
+                <a:shade val="50000"/>
+              </a:schemeClr>
+            </a:lnRef>
+            <a:fillRef idx="1">
+              <a:schemeClr val="accent1"/>
+            </a:fillRef>
+            <a:effectRef idx="0">
+              <a:schemeClr val="accent1"/>
+            </a:effectRef>
+            <a:fontRef idx="minor">
+              <a:schemeClr val="lt1"/>
+            </a:fontRef>
+          </p:style>
+          <p:txBody>
+            <a:bodyPr rtlCol="0" anchor="ctr"/>
+            <a:lstStyle/>
+            <a:p>
+              <a:pPr algn="ctr"/>
+              <a:endParaRPr lang="ko-KR" altLang="en-US">
+                <a:solidFill>
+                  <a:prstClr val="white"/>
+                </a:solidFill>
+              </a:endParaRPr>
+            </a:p>
+          </p:txBody>
+        </p:sp>
+        <p:sp>
+          <p:nvSpPr>
+            <p:cNvPr id="17" name="직각 삼각형 16">
+              <a:extLst>
+                <a:ext uri="{FF2B5EF4-FFF2-40B4-BE49-F238E27FC236}">
+                  <a16:creationId xmlns:a16="http://schemas.microsoft.com/office/drawing/2014/main" id="{7F68E216-A0B8-43CF-8570-8BF98D9FC025}"/>
+                </a:ext>
+              </a:extLst>
+            </p:cNvPr>
+            <p:cNvSpPr/>
+            <p:nvPr/>
+          </p:nvSpPr>
+          <p:spPr>
+            <a:xfrm rot="16200000">
+              <a:off x="9919316" y="4585315"/>
+              <a:ext cx="1136342" cy="1136342"/>
+            </a:xfrm>
+            <a:prstGeom prst="rtTriangle">
+              <a:avLst/>
+            </a:prstGeom>
+            <a:solidFill>
+              <a:srgbClr val="00B0F0"/>
+            </a:solidFill>
+            <a:ln>
+              <a:noFill/>
+            </a:ln>
+          </p:spPr>
+          <p:style>
+            <a:lnRef idx="2">
+              <a:schemeClr val="accent1">
+                <a:shade val="50000"/>
+              </a:schemeClr>
+            </a:lnRef>
+            <a:fillRef idx="1">
+              <a:schemeClr val="accent1"/>
+            </a:fillRef>
+            <a:effectRef idx="0">
+              <a:schemeClr val="accent1"/>
+            </a:effectRef>
+            <a:fontRef idx="minor">
+              <a:schemeClr val="lt1"/>
+            </a:fontRef>
+          </p:style>
+          <p:txBody>
+            <a:bodyPr rtlCol="0" anchor="ctr"/>
+            <a:lstStyle/>
+            <a:p>
+              <a:pPr algn="ctr"/>
+              <a:endParaRPr lang="ko-KR" altLang="en-US">
+                <a:solidFill>
+                  <a:prstClr val="white"/>
+                </a:solidFill>
+              </a:endParaRPr>
+            </a:p>
+          </p:txBody>
+        </p:sp>
+      </p:grpSp>
+      <p:sp>
+        <p:nvSpPr>
+          <p:cNvPr id="4" name="사각형: 잘린 대각선 방향 모서리 3">
+            <a:extLst>
+              <a:ext uri="{FF2B5EF4-FFF2-40B4-BE49-F238E27FC236}">
+                <a16:creationId xmlns:a16="http://schemas.microsoft.com/office/drawing/2014/main" id="{08B82C56-1586-46D4-ABD9-26E08ABB5530}"/>
+              </a:ext>
+            </a:extLst>
+          </p:cNvPr>
+          <p:cNvSpPr/>
+          <p:nvPr/>
+        </p:nvSpPr>
+        <p:spPr>
+          <a:xfrm>
+            <a:off x="410766" y="5176007"/>
+            <a:ext cx="11370470" cy="1518408"/>
+          </a:xfrm>
+          <a:prstGeom prst="snip2DiagRect">
+            <a:avLst>
+              <a:gd name="adj1" fmla="val 0"/>
+              <a:gd name="adj2" fmla="val 23481"/>
+            </a:avLst>
+          </a:prstGeom>
+          <a:solidFill>
+            <a:schemeClr val="bg1"/>
+          </a:solidFill>
+          <a:ln w="19050">
+            <a:solidFill>
+              <a:srgbClr val="214867"/>
+            </a:solidFill>
+          </a:ln>
+        </p:spPr>
+        <p:style>
+          <a:lnRef idx="2">
+            <a:schemeClr val="accent1">
+              <a:shade val="50000"/>
+            </a:schemeClr>
+          </a:lnRef>
+          <a:fillRef idx="1">
+            <a:schemeClr val="accent1"/>
+          </a:fillRef>
+          <a:effectRef idx="0">
+            <a:schemeClr val="accent1"/>
+          </a:effectRef>
+          <a:fontRef idx="minor">
+            <a:schemeClr val="lt1"/>
+          </a:fontRef>
+        </p:style>
+        <p:txBody>
+          <a:bodyPr rtlCol="0" anchor="ctr"/>
+          <a:lstStyle/>
+          <a:p>
+            <a:pPr algn="ctr"/>
+            <a:endParaRPr lang="ko-KR" altLang="en-US">
+              <a:solidFill>
+                <a:prstClr val="white"/>
+              </a:solidFill>
+            </a:endParaRPr>
+          </a:p>
+        </p:txBody>
+      </p:sp>
+      <p:sp>
+        <p:nvSpPr>
+          <p:cNvPr id="7" name="직각 삼각형 6">
+            <a:extLst>
+              <a:ext uri="{FF2B5EF4-FFF2-40B4-BE49-F238E27FC236}">
+                <a16:creationId xmlns:a16="http://schemas.microsoft.com/office/drawing/2014/main" id="{29DACB4C-E508-4515-B0C8-605AB8D32FD4}"/>
+              </a:ext>
+            </a:extLst>
+          </p:cNvPr>
+          <p:cNvSpPr/>
+          <p:nvPr/>
+        </p:nvSpPr>
+        <p:spPr>
+          <a:xfrm rot="10800000">
+            <a:off x="11386655" y="5175160"/>
+            <a:ext cx="394577" cy="516727"/>
+          </a:xfrm>
+          <a:prstGeom prst="rtTriangle">
+            <a:avLst/>
+          </a:prstGeom>
+          <a:solidFill>
+            <a:srgbClr val="00B0F0"/>
+          </a:solidFill>
+          <a:ln w="19050">
+            <a:solidFill>
+              <a:srgbClr val="214867"/>
+            </a:solidFill>
+          </a:ln>
+        </p:spPr>
+        <p:style>
+          <a:lnRef idx="2">
+            <a:schemeClr val="accent1">
+              <a:shade val="50000"/>
+            </a:schemeClr>
+          </a:lnRef>
+          <a:fillRef idx="1">
+            <a:schemeClr val="accent1"/>
+          </a:fillRef>
+          <a:effectRef idx="0">
+            <a:schemeClr val="accent1"/>
+          </a:effectRef>
+          <a:fontRef idx="minor">
+            <a:schemeClr val="lt1"/>
+          </a:fontRef>
+        </p:style>
+        <p:txBody>
+          <a:bodyPr rtlCol="0" anchor="ctr"/>
+          <a:lstStyle/>
+          <a:p>
+            <a:pPr algn="ctr"/>
+            <a:endParaRPr lang="ko-KR" altLang="en-US">
+              <a:solidFill>
+                <a:prstClr val="white"/>
+              </a:solidFill>
+            </a:endParaRPr>
+          </a:p>
+        </p:txBody>
+      </p:sp>
+      <p:sp>
+        <p:nvSpPr>
+          <p:cNvPr id="9" name="직각 삼각형 8">
+            <a:extLst>
+              <a:ext uri="{FF2B5EF4-FFF2-40B4-BE49-F238E27FC236}">
+                <a16:creationId xmlns:a16="http://schemas.microsoft.com/office/drawing/2014/main" id="{1CF6651A-4729-49F7-AA04-E50AFF204AAE}"/>
+              </a:ext>
+            </a:extLst>
+          </p:cNvPr>
+          <p:cNvSpPr/>
+          <p:nvPr/>
+        </p:nvSpPr>
+        <p:spPr>
+          <a:xfrm>
+            <a:off x="410764" y="6182685"/>
+            <a:ext cx="394579" cy="511729"/>
+          </a:xfrm>
+          <a:prstGeom prst="rtTriangle">
+            <a:avLst/>
+          </a:prstGeom>
+          <a:solidFill>
+            <a:srgbClr val="00B0F0"/>
+          </a:solidFill>
+          <a:ln w="19050">
+            <a:solidFill>
+              <a:srgbClr val="214867"/>
+            </a:solidFill>
+          </a:ln>
+        </p:spPr>
+        <p:style>
+          <a:lnRef idx="2">
+            <a:schemeClr val="accent1">
+              <a:shade val="50000"/>
+            </a:schemeClr>
+          </a:lnRef>
+          <a:fillRef idx="1">
+            <a:schemeClr val="accent1"/>
+          </a:fillRef>
+          <a:effectRef idx="0">
+            <a:schemeClr val="accent1"/>
+          </a:effectRef>
+          <a:fontRef idx="minor">
+            <a:schemeClr val="lt1"/>
+          </a:fontRef>
+        </p:style>
+        <p:txBody>
+          <a:bodyPr rtlCol="0" anchor="ctr"/>
+          <a:lstStyle/>
+          <a:p>
+            <a:pPr algn="ctr"/>
+            <a:endParaRPr lang="ko-KR" altLang="en-US">
+              <a:solidFill>
+                <a:prstClr val="white"/>
+              </a:solidFill>
+            </a:endParaRPr>
+          </a:p>
+        </p:txBody>
+      </p:sp>
+      <p:sp>
+        <p:nvSpPr>
+          <p:cNvPr id="54" name="직사각형 53">
+            <a:extLst>
+              <a:ext uri="{FF2B5EF4-FFF2-40B4-BE49-F238E27FC236}">
+                <a16:creationId xmlns:a16="http://schemas.microsoft.com/office/drawing/2014/main" id="{14A3EEB3-1E7B-482E-8AD4-3134B07E8FF0}"/>
+              </a:ext>
+            </a:extLst>
+          </p:cNvPr>
+          <p:cNvSpPr/>
+          <p:nvPr/>
+        </p:nvSpPr>
+        <p:spPr>
+          <a:xfrm>
+            <a:off x="2645546" y="5175159"/>
+            <a:ext cx="9135685" cy="1519255"/>
+          </a:xfrm>
+          <a:prstGeom prst="rect">
+            <a:avLst/>
+          </a:prstGeom>
+          <a:noFill/>
+          <a:ln>
+            <a:noFill/>
+          </a:ln>
+        </p:spPr>
+        <p:style>
+          <a:lnRef idx="2">
+            <a:schemeClr val="accent1">
+              <a:shade val="50000"/>
+            </a:schemeClr>
+          </a:lnRef>
+          <a:fillRef idx="1">
+            <a:schemeClr val="accent1"/>
+          </a:fillRef>
+          <a:effectRef idx="0">
+            <a:schemeClr val="accent1"/>
+          </a:effectRef>
+          <a:fontRef idx="minor">
+            <a:schemeClr val="lt1"/>
+          </a:fontRef>
+        </p:style>
+        <p:txBody>
+          <a:bodyPr rtlCol="0" anchor="ctr"/>
+          <a:lstStyle/>
+          <a:p>
+            <a:pPr marL="228600" indent="-228600">
+              <a:lnSpc>
+                <a:spcPct val="150000"/>
+              </a:lnSpc>
+              <a:buFont typeface="+mj-lt"/>
+              <a:buAutoNum type="arabicPeriod"/>
+            </a:pPr>
+            <a:r>
+              <a:rPr lang="ko-KR" altLang="en-US" sz="1200" dirty="0">
+                <a:solidFill>
+                  <a:srgbClr val="78808D"/>
+                </a:solidFill>
+              </a:rPr>
+              <a:t>임시저장소가 필요한 이유는 프로젝트를 </a:t>
+            </a:r>
+            <a:r>
+              <a:rPr lang="ko-KR" altLang="en-US" sz="1200" dirty="0" err="1">
+                <a:solidFill>
+                  <a:srgbClr val="78808D"/>
+                </a:solidFill>
+              </a:rPr>
+              <a:t>하다보면</a:t>
+            </a:r>
+            <a:r>
+              <a:rPr lang="ko-KR" altLang="en-US" sz="1200" dirty="0">
+                <a:solidFill>
+                  <a:srgbClr val="78808D"/>
+                </a:solidFill>
+              </a:rPr>
+              <a:t> 핵심적인 파일과 테스트파일</a:t>
+            </a:r>
+            <a:r>
+              <a:rPr lang="en-US" altLang="ko-KR" sz="1200" dirty="0">
+                <a:solidFill>
+                  <a:srgbClr val="78808D"/>
+                </a:solidFill>
+              </a:rPr>
+              <a:t>, </a:t>
+            </a:r>
+            <a:r>
+              <a:rPr lang="ko-KR" altLang="en-US" sz="1200" dirty="0">
+                <a:solidFill>
+                  <a:srgbClr val="78808D"/>
+                </a:solidFill>
+              </a:rPr>
+              <a:t>임시적인 파일이 있는데 걔는 버전관리를 </a:t>
+            </a:r>
+            <a:r>
+              <a:rPr lang="ko-KR" altLang="en-US" sz="1200" dirty="0" err="1">
+                <a:solidFill>
+                  <a:srgbClr val="78808D"/>
+                </a:solidFill>
+              </a:rPr>
+              <a:t>할필요가</a:t>
+            </a:r>
+            <a:r>
+              <a:rPr lang="ko-KR" altLang="en-US" sz="1200" dirty="0">
+                <a:solidFill>
+                  <a:srgbClr val="78808D"/>
+                </a:solidFill>
+              </a:rPr>
+              <a:t> 없다 파일을 배제하기위해 깃에게 명확하게 알려주며 불편하지만 그만큼 정확하다</a:t>
+            </a:r>
+            <a:endParaRPr lang="en-US" altLang="ko-KR" sz="1200" dirty="0">
+              <a:solidFill>
+                <a:srgbClr val="78808D"/>
+              </a:solidFill>
+            </a:endParaRPr>
+          </a:p>
+        </p:txBody>
+      </p:sp>
+      <p:grpSp>
+        <p:nvGrpSpPr>
+          <p:cNvPr id="2" name="그룹 1">
+            <a:extLst>
+              <a:ext uri="{FF2B5EF4-FFF2-40B4-BE49-F238E27FC236}">
+                <a16:creationId xmlns:a16="http://schemas.microsoft.com/office/drawing/2014/main" id="{4E9B9147-A66C-4872-AF5A-EC68234851F3}"/>
+              </a:ext>
+            </a:extLst>
+          </p:cNvPr>
+          <p:cNvGrpSpPr/>
+          <p:nvPr/>
+        </p:nvGrpSpPr>
+        <p:grpSpPr>
+          <a:xfrm>
+            <a:off x="1734497" y="1081190"/>
+            <a:ext cx="8723006" cy="3816989"/>
+            <a:chOff x="1734497" y="1000390"/>
+            <a:chExt cx="8723006" cy="3816989"/>
+          </a:xfrm>
+        </p:grpSpPr>
+        <p:pic>
+          <p:nvPicPr>
+            <p:cNvPr id="3" name="그림 2">
+              <a:extLst>
+                <a:ext uri="{FF2B5EF4-FFF2-40B4-BE49-F238E27FC236}">
+                  <a16:creationId xmlns:a16="http://schemas.microsoft.com/office/drawing/2014/main" id="{5E231C85-7C38-4544-B845-64ABFEE33416}"/>
+                </a:ext>
+              </a:extLst>
+            </p:cNvPr>
+            <p:cNvPicPr>
+              <a:picLocks noChangeAspect="1"/>
+            </p:cNvPicPr>
+            <p:nvPr/>
+          </p:nvPicPr>
+          <p:blipFill>
+            <a:blip r:embed="rId2">
+              <a:extLst>
+                <a:ext uri="{28A0092B-C50C-407E-A947-70E740481C1C}">
+                  <a14:useLocalDpi xmlns:a14="http://schemas.microsoft.com/office/drawing/2010/main" val="0"/>
+                </a:ext>
+              </a:extLst>
+            </a:blip>
+            <a:stretch>
+              <a:fillRect/>
+            </a:stretch>
+          </p:blipFill>
+          <p:spPr>
+            <a:xfrm>
+              <a:off x="1734497" y="1000390"/>
+              <a:ext cx="8723006" cy="3816989"/>
+            </a:xfrm>
+            <a:prstGeom prst="rect">
+              <a:avLst/>
+            </a:prstGeom>
+          </p:spPr>
+        </p:pic>
+        <p:sp>
+          <p:nvSpPr>
+            <p:cNvPr id="12" name="직사각형 11">
+              <a:extLst>
+                <a:ext uri="{FF2B5EF4-FFF2-40B4-BE49-F238E27FC236}">
+                  <a16:creationId xmlns:a16="http://schemas.microsoft.com/office/drawing/2014/main" id="{59B63A1B-D24D-442F-9D16-A33971489EAC}"/>
+                </a:ext>
+              </a:extLst>
+            </p:cNvPr>
+            <p:cNvSpPr/>
+            <p:nvPr/>
+          </p:nvSpPr>
+          <p:spPr>
+            <a:xfrm>
+              <a:off x="3976382" y="3074799"/>
+              <a:ext cx="729842" cy="227690"/>
+            </a:xfrm>
+            <a:prstGeom prst="rect">
+              <a:avLst/>
+            </a:prstGeom>
+            <a:noFill/>
+            <a:ln w="25400">
+              <a:solidFill>
+                <a:srgbClr val="FF0000"/>
+              </a:solidFill>
+            </a:ln>
+          </p:spPr>
+          <p:style>
+            <a:lnRef idx="2">
+              <a:schemeClr val="accent1">
+                <a:shade val="50000"/>
+              </a:schemeClr>
+            </a:lnRef>
+            <a:fillRef idx="1">
+              <a:schemeClr val="accent1"/>
+            </a:fillRef>
+            <a:effectRef idx="0">
+              <a:schemeClr val="accent1"/>
+            </a:effectRef>
+            <a:fontRef idx="minor">
+              <a:schemeClr val="lt1"/>
+            </a:fontRef>
+          </p:style>
+          <p:txBody>
+            <a:bodyPr rtlCol="0" anchor="ctr"/>
+            <a:lstStyle/>
+            <a:p>
+              <a:pPr algn="ctr"/>
+              <a:endParaRPr lang="ko-KR" altLang="en-US"/>
+            </a:p>
+          </p:txBody>
+        </p:sp>
+        <p:sp>
+          <p:nvSpPr>
+            <p:cNvPr id="19" name="직사각형 18">
+              <a:extLst>
+                <a:ext uri="{FF2B5EF4-FFF2-40B4-BE49-F238E27FC236}">
+                  <a16:creationId xmlns:a16="http://schemas.microsoft.com/office/drawing/2014/main" id="{A6A47128-3D9E-4032-8F4B-3D6E757A3DC7}"/>
+                </a:ext>
+              </a:extLst>
+            </p:cNvPr>
+            <p:cNvSpPr/>
+            <p:nvPr/>
+          </p:nvSpPr>
+          <p:spPr>
+            <a:xfrm>
+              <a:off x="5130477" y="4027694"/>
+              <a:ext cx="1225934" cy="189200"/>
+            </a:xfrm>
+            <a:prstGeom prst="rect">
+              <a:avLst/>
+            </a:prstGeom>
+            <a:noFill/>
+            <a:ln w="25400">
+              <a:solidFill>
+                <a:srgbClr val="FF0000"/>
+              </a:solidFill>
+            </a:ln>
+          </p:spPr>
+          <p:style>
+            <a:lnRef idx="2">
+              <a:schemeClr val="accent1">
+                <a:shade val="50000"/>
+              </a:schemeClr>
+            </a:lnRef>
+            <a:fillRef idx="1">
+              <a:schemeClr val="accent1"/>
+            </a:fillRef>
+            <a:effectRef idx="0">
+              <a:schemeClr val="accent1"/>
+            </a:effectRef>
+            <a:fontRef idx="minor">
+              <a:schemeClr val="lt1"/>
+            </a:fontRef>
+          </p:style>
+          <p:txBody>
+            <a:bodyPr rtlCol="0" anchor="ctr"/>
+            <a:lstStyle/>
+            <a:p>
+              <a:pPr algn="ctr"/>
+              <a:endParaRPr lang="ko-KR" altLang="en-US"/>
+            </a:p>
+          </p:txBody>
+        </p:sp>
+        <p:sp>
+          <p:nvSpPr>
+            <p:cNvPr id="18" name="직사각형 17">
+              <a:extLst>
+                <a:ext uri="{FF2B5EF4-FFF2-40B4-BE49-F238E27FC236}">
+                  <a16:creationId xmlns:a16="http://schemas.microsoft.com/office/drawing/2014/main" id="{63782BF2-8751-42A2-A303-602C6FA2C42A}"/>
+                </a:ext>
+              </a:extLst>
+            </p:cNvPr>
+            <p:cNvSpPr/>
+            <p:nvPr/>
+          </p:nvSpPr>
+          <p:spPr>
+            <a:xfrm>
+              <a:off x="8424095" y="3429000"/>
+              <a:ext cx="729842" cy="227690"/>
+            </a:xfrm>
+            <a:prstGeom prst="rect">
+              <a:avLst/>
+            </a:prstGeom>
+            <a:noFill/>
+            <a:ln w="25400">
+              <a:solidFill>
+                <a:srgbClr val="00B0F0"/>
+              </a:solidFill>
+            </a:ln>
+          </p:spPr>
+          <p:style>
+            <a:lnRef idx="2">
+              <a:schemeClr val="accent1">
+                <a:shade val="50000"/>
+              </a:schemeClr>
+            </a:lnRef>
+            <a:fillRef idx="1">
+              <a:schemeClr val="accent1"/>
+            </a:fillRef>
+            <a:effectRef idx="0">
+              <a:schemeClr val="accent1"/>
+            </a:effectRef>
+            <a:fontRef idx="minor">
+              <a:schemeClr val="lt1"/>
+            </a:fontRef>
+          </p:style>
+          <p:txBody>
+            <a:bodyPr rtlCol="0" anchor="ctr"/>
+            <a:lstStyle/>
+            <a:p>
+              <a:pPr algn="ctr"/>
+              <a:endParaRPr lang="ko-KR" altLang="en-US"/>
+            </a:p>
+          </p:txBody>
+        </p:sp>
+        <p:sp>
+          <p:nvSpPr>
+            <p:cNvPr id="21" name="직사각형 20">
+              <a:extLst>
+                <a:ext uri="{FF2B5EF4-FFF2-40B4-BE49-F238E27FC236}">
+                  <a16:creationId xmlns:a16="http://schemas.microsoft.com/office/drawing/2014/main" id="{DF9C59D6-71DC-4244-8156-9693155DD8D7}"/>
+                </a:ext>
+              </a:extLst>
+            </p:cNvPr>
+            <p:cNvSpPr/>
+            <p:nvPr/>
+          </p:nvSpPr>
+          <p:spPr>
+            <a:xfrm>
+              <a:off x="5769671" y="4520954"/>
+              <a:ext cx="729842" cy="227690"/>
+            </a:xfrm>
+            <a:prstGeom prst="rect">
+              <a:avLst/>
+            </a:prstGeom>
+            <a:noFill/>
+            <a:ln w="25400">
+              <a:solidFill>
+                <a:srgbClr val="00B0F0"/>
+              </a:solidFill>
+            </a:ln>
+          </p:spPr>
+          <p:style>
+            <a:lnRef idx="2">
+              <a:schemeClr val="accent1">
+                <a:shade val="50000"/>
+              </a:schemeClr>
+            </a:lnRef>
+            <a:fillRef idx="1">
+              <a:schemeClr val="accent1"/>
+            </a:fillRef>
+            <a:effectRef idx="0">
+              <a:schemeClr val="accent1"/>
+            </a:effectRef>
+            <a:fontRef idx="minor">
+              <a:schemeClr val="lt1"/>
+            </a:fontRef>
+          </p:style>
+          <p:txBody>
+            <a:bodyPr rtlCol="0" anchor="ctr"/>
+            <a:lstStyle/>
+            <a:p>
+              <a:pPr algn="ctr"/>
+              <a:endParaRPr lang="ko-KR" altLang="en-US"/>
+            </a:p>
+          </p:txBody>
+        </p:sp>
+      </p:grpSp>
+    </p:spTree>
+    <p:extLst>
+      <p:ext uri="{BB962C8B-B14F-4D97-AF65-F5344CB8AC3E}">
+        <p14:creationId xmlns:p14="http://schemas.microsoft.com/office/powerpoint/2010/main" val="872120850"/>
+      </p:ext>
+    </p:extLst>
+  </p:cSld>
+  <p:clrMapOvr>
+    <a:masterClrMapping/>
+  </p:clrMapOvr>
+</p:sld>
+</file>
+
+<file path=ppt/slides/slide13.xml><?xml version="1.0" encoding="utf-8"?>
 <p:sld xmlns:a="http://schemas.openxmlformats.org/drawingml/2006/main" xmlns:r="http://schemas.openxmlformats.org/officeDocument/2006/relationships" xmlns:p="http://schemas.openxmlformats.org/presentationml/2006/main">
   <p:cSld>
     <p:spTree>
@@ -6797,7 +8479,7 @@
 </p:sld>
 </file>
 
-<file path=ppt/slides/slide12.xml><?xml version="1.0" encoding="utf-8"?>
+<file path=ppt/slides/slide14.xml><?xml version="1.0" encoding="utf-8"?>
 <p:sld xmlns:a="http://schemas.openxmlformats.org/drawingml/2006/main" xmlns:r="http://schemas.openxmlformats.org/officeDocument/2006/relationships" xmlns:p="http://schemas.openxmlformats.org/presentationml/2006/main">
   <p:cSld>
     <p:bg>
@@ -9964,20 +11646,28 @@
               </a:lnSpc>
             </a:pPr>
             <a:r>
+              <a:rPr lang="ko-KR" altLang="en-US" sz="2500" b="1" dirty="0">
+                <a:solidFill>
+                  <a:srgbClr val="00B0F0"/>
+                </a:solidFill>
+              </a:rPr>
+              <a:t>동기</a:t>
+            </a:r>
+            <a:r>
+              <a:rPr lang="en-US" altLang="ko-KR" sz="1600" b="1" dirty="0">
+                <a:solidFill>
+                  <a:srgbClr val="00B0F0"/>
+                </a:solidFill>
+              </a:rPr>
+              <a:t>(synchronous)</a:t>
+            </a:r>
+            <a:r>
               <a:rPr lang="en-US" altLang="ko-KR" sz="2500" b="1" dirty="0">
                 <a:solidFill>
                   <a:srgbClr val="00B0F0"/>
                 </a:solidFill>
               </a:rPr>
-              <a:t>Ajax</a:t>
-            </a:r>
-            <a:r>
-              <a:rPr lang="en-US" altLang="ko-KR" sz="1600" b="1" dirty="0">
-                <a:solidFill>
-                  <a:srgbClr val="00B0F0"/>
-                </a:solidFill>
-              </a:rPr>
-              <a:t>(Asynchronous JavaScript and XML)</a:t>
+              <a:t> </a:t>
             </a:r>
           </a:p>
           <a:p>
@@ -9986,11 +11676,70 @@
                 <a:spcPct val="150000"/>
               </a:lnSpc>
             </a:pPr>
-            <a:endParaRPr lang="en-US" altLang="ko-KR" sz="1200" b="1" dirty="0">
-              <a:solidFill>
-                <a:srgbClr val="00B0F0"/>
-              </a:solidFill>
-            </a:endParaRPr>
+            <a:r>
+              <a:rPr lang="ko-KR" altLang="en-US" sz="1200" dirty="0">
+                <a:solidFill>
+                  <a:srgbClr val="78808D"/>
+                </a:solidFill>
+              </a:rPr>
+              <a:t>직렬적으로 태스크</a:t>
+            </a:r>
+            <a:r>
+              <a:rPr lang="en-US" altLang="ko-KR" sz="1200" dirty="0">
+                <a:solidFill>
+                  <a:srgbClr val="78808D"/>
+                </a:solidFill>
+              </a:rPr>
+              <a:t>(task)</a:t>
+            </a:r>
+            <a:r>
+              <a:rPr lang="ko-KR" altLang="en-US" sz="1200" dirty="0">
+                <a:solidFill>
+                  <a:srgbClr val="78808D"/>
+                </a:solidFill>
+              </a:rPr>
+              <a:t>를 수행한다</a:t>
+            </a:r>
+            <a:r>
+              <a:rPr lang="en-US" altLang="ko-KR" sz="1200" dirty="0">
+                <a:solidFill>
+                  <a:srgbClr val="78808D"/>
+                </a:solidFill>
+              </a:rPr>
+              <a:t>. </a:t>
+            </a:r>
+            <a:r>
+              <a:rPr lang="ko-KR" altLang="en-US" sz="1200" dirty="0">
+                <a:solidFill>
+                  <a:srgbClr val="78808D"/>
+                </a:solidFill>
+              </a:rPr>
+              <a:t> 작업이 </a:t>
+            </a:r>
+            <a:r>
+              <a:rPr lang="ko-KR" altLang="en-US" sz="1200" b="1" dirty="0">
+                <a:solidFill>
+                  <a:srgbClr val="78808D"/>
+                </a:solidFill>
+              </a:rPr>
+              <a:t>순차적으로 실행</a:t>
+            </a:r>
+            <a:r>
+              <a:rPr lang="ko-KR" altLang="en-US" sz="1200" dirty="0">
+                <a:solidFill>
+                  <a:srgbClr val="78808D"/>
+                </a:solidFill>
+              </a:rPr>
+              <a:t>되며 어떤 작업이 수행 중이면 다음 작업은 대기하게 된다</a:t>
+            </a:r>
+            <a:r>
+              <a:rPr lang="en-US" altLang="ko-KR" sz="1200" dirty="0">
+                <a:solidFill>
+                  <a:srgbClr val="78808D"/>
+                </a:solidFill>
+              </a:rPr>
+              <a:t>.</a:t>
+            </a:r>
           </a:p>
           <a:p>
             <a:pPr>
@@ -9998,70 +11747,11 @@
                 <a:spcPct val="150000"/>
               </a:lnSpc>
             </a:pPr>
-            <a:r>
-              <a:rPr lang="en-US" altLang="ko-KR" sz="1050" b="1" dirty="0">
-                <a:solidFill>
-                  <a:srgbClr val="78808D"/>
-                </a:solidFill>
-              </a:rPr>
-              <a:t>Ajax</a:t>
-            </a:r>
-            <a:r>
-              <a:rPr lang="ko-KR" altLang="en-US" sz="1050" b="1" dirty="0">
-                <a:solidFill>
-                  <a:srgbClr val="78808D"/>
-                </a:solidFill>
-              </a:rPr>
-              <a:t>는 웹 페이지 전체를 다시 로딩 하지 않고도</a:t>
-            </a:r>
-            <a:r>
-              <a:rPr lang="en-US" altLang="ko-KR" sz="1050" b="1" dirty="0">
-                <a:solidFill>
-                  <a:srgbClr val="78808D"/>
-                </a:solidFill>
-              </a:rPr>
-              <a:t>, </a:t>
-            </a:r>
-            <a:r>
-              <a:rPr lang="ko-KR" altLang="en-US" sz="1050" b="1" dirty="0">
-                <a:solidFill>
-                  <a:srgbClr val="78808D"/>
-                </a:solidFill>
-              </a:rPr>
-              <a:t>웹 페이지의 일부분만을 갱신할 수 있도록 해주는 개발 기법이다 </a:t>
-            </a:r>
-            <a:r>
-              <a:rPr lang="ko-KR" altLang="en-US" sz="1050" dirty="0">
-                <a:solidFill>
-                  <a:srgbClr val="78808D"/>
-                </a:solidFill>
-              </a:rPr>
-              <a:t>하나의 특정한 기술을 말하는 것이 아니며</a:t>
-            </a:r>
-            <a:r>
-              <a:rPr lang="en-US" altLang="ko-KR" sz="1050" dirty="0">
-                <a:solidFill>
-                  <a:srgbClr val="78808D"/>
-                </a:solidFill>
-              </a:rPr>
-              <a:t>, </a:t>
-            </a:r>
-            <a:r>
-              <a:rPr lang="ko-KR" altLang="en-US" sz="1050" dirty="0">
-                <a:solidFill>
-                  <a:srgbClr val="78808D"/>
-                </a:solidFill>
-              </a:rPr>
-              <a:t>함께 사용하는 기술의 묶음을 지칭하는 용어이다</a:t>
-            </a:r>
-            <a:r>
-              <a:rPr lang="en-US" altLang="ko-KR" sz="1050" dirty="0">
-                <a:solidFill>
-                  <a:srgbClr val="78808D"/>
-                </a:solidFill>
-              </a:rPr>
-              <a:t>. </a:t>
-            </a:r>
+            <a:endParaRPr lang="en-US" altLang="ko-KR" sz="1200" dirty="0">
+              <a:solidFill>
+                <a:srgbClr val="78808D"/>
+              </a:solidFill>
+            </a:endParaRPr>
           </a:p>
           <a:p>
             <a:pPr>
@@ -10069,7 +11759,7 @@
                 <a:spcPct val="150000"/>
               </a:lnSpc>
             </a:pPr>
-            <a:endParaRPr lang="en-US" altLang="ko-KR" sz="1050" dirty="0">
+            <a:endParaRPr lang="en-US" altLang="ko-KR" sz="1200" dirty="0">
               <a:solidFill>
                 <a:srgbClr val="78808D"/>
               </a:solidFill>
@@ -10081,190 +11771,110 @@
                 <a:spcPct val="150000"/>
               </a:lnSpc>
             </a:pPr>
-            <a:endParaRPr lang="en-US" altLang="ko-KR" sz="1050" dirty="0">
+            <a:endParaRPr lang="en-US" altLang="ko-KR" sz="1200" dirty="0">
               <a:solidFill>
                 <a:srgbClr val="78808D"/>
               </a:solidFill>
             </a:endParaRPr>
           </a:p>
           <a:p>
-            <a:pPr marL="171450" indent="-171450">
+            <a:pPr>
               <a:lnSpc>
                 <a:spcPct val="150000"/>
               </a:lnSpc>
-              <a:buFont typeface="Arial" panose="020B0604020202020204" pitchFamily="34" charset="0"/>
-              <a:buChar char="•"/>
             </a:pPr>
-            <a:r>
-              <a:rPr lang="ko-KR" altLang="en-US" sz="1050" dirty="0">
-                <a:solidFill>
-                  <a:srgbClr val="78808D"/>
-                </a:solidFill>
-              </a:rPr>
-              <a:t>웹 페이지의 표현을 위한 </a:t>
-            </a:r>
-            <a:r>
-              <a:rPr lang="en-US" altLang="ko-KR" sz="1050" b="1" dirty="0">
-                <a:solidFill>
-                  <a:srgbClr val="78808D"/>
-                </a:solidFill>
-              </a:rPr>
-              <a:t>HTML</a:t>
-            </a:r>
-            <a:r>
-              <a:rPr lang="ko-KR" altLang="en-US" sz="1050" dirty="0">
-                <a:solidFill>
-                  <a:srgbClr val="78808D"/>
-                </a:solidFill>
-              </a:rPr>
-              <a:t>과 </a:t>
-            </a:r>
-            <a:r>
-              <a:rPr lang="en-US" altLang="ko-KR" sz="1050" b="1" dirty="0">
-                <a:solidFill>
-                  <a:srgbClr val="78808D"/>
-                </a:solidFill>
-              </a:rPr>
-              <a:t>CSS</a:t>
-            </a:r>
-          </a:p>
-          <a:p>
-            <a:pPr marL="171450" indent="-171450">
+            <a:endParaRPr lang="en-US" altLang="ko-KR" sz="1200" dirty="0">
+              <a:solidFill>
+                <a:srgbClr val="78808D"/>
+              </a:solidFill>
+            </a:endParaRPr>
+          </a:p>
+          <a:p>
+            <a:pPr>
               <a:lnSpc>
                 <a:spcPct val="150000"/>
               </a:lnSpc>
-              <a:buFont typeface="Arial" panose="020B0604020202020204" pitchFamily="34" charset="0"/>
-              <a:buChar char="•"/>
             </a:pPr>
             <a:r>
-              <a:rPr lang="ko-KR" altLang="en-US" sz="1050" dirty="0">
-                <a:solidFill>
-                  <a:srgbClr val="78808D"/>
-                </a:solidFill>
-              </a:rPr>
-              <a:t>데이터에 접근하거나 화면 구성을 동적으로 조작하기 위해 사용되는 </a:t>
-            </a:r>
-            <a:r>
-              <a:rPr lang="en-US" altLang="ko-KR" sz="1050" b="1" dirty="0">
-                <a:solidFill>
-                  <a:srgbClr val="78808D"/>
-                </a:solidFill>
-              </a:rPr>
-              <a:t>DOM</a:t>
-            </a:r>
-          </a:p>
-          <a:p>
-            <a:pPr marL="171450" indent="-171450">
+              <a:rPr lang="ko-KR" altLang="en-US" sz="2500" b="1" dirty="0">
+                <a:solidFill>
+                  <a:srgbClr val="00B0F0"/>
+                </a:solidFill>
+              </a:rPr>
+              <a:t>비동기</a:t>
+            </a:r>
+            <a:r>
+              <a:rPr lang="en-US" altLang="ko-KR" sz="1600" b="1" dirty="0">
+                <a:solidFill>
+                  <a:srgbClr val="00B0F0"/>
+                </a:solidFill>
+              </a:rPr>
+              <a:t>(Asynchronous)</a:t>
+            </a:r>
+          </a:p>
+          <a:p>
+            <a:pPr>
               <a:lnSpc>
                 <a:spcPct val="150000"/>
               </a:lnSpc>
-              <a:buFont typeface="Arial" panose="020B0604020202020204" pitchFamily="34" charset="0"/>
-              <a:buChar char="•"/>
             </a:pPr>
             <a:r>
-              <a:rPr lang="ko-KR" altLang="en-US" sz="1050" dirty="0">
-                <a:solidFill>
-                  <a:srgbClr val="78808D"/>
-                </a:solidFill>
-              </a:rPr>
-              <a:t>데이터의 교환을 위한 </a:t>
-            </a:r>
-            <a:r>
-              <a:rPr lang="en-US" altLang="ko-KR" sz="1050" b="1" dirty="0">
-                <a:solidFill>
-                  <a:srgbClr val="78808D"/>
-                </a:solidFill>
-              </a:rPr>
-              <a:t>JSON</a:t>
-            </a:r>
-            <a:r>
-              <a:rPr lang="ko-KR" altLang="en-US" sz="1050" dirty="0">
-                <a:solidFill>
-                  <a:srgbClr val="78808D"/>
-                </a:solidFill>
-              </a:rPr>
-              <a:t>이나 </a:t>
-            </a:r>
-            <a:r>
-              <a:rPr lang="en-US" altLang="ko-KR" sz="1050" b="1" dirty="0">
-                <a:solidFill>
-                  <a:srgbClr val="78808D"/>
-                </a:solidFill>
-              </a:rPr>
-              <a:t>XML</a:t>
-            </a:r>
-          </a:p>
-          <a:p>
-            <a:pPr marL="171450" indent="-171450">
-              <a:lnSpc>
-                <a:spcPct val="150000"/>
-              </a:lnSpc>
-              <a:buFont typeface="Arial" panose="020B0604020202020204" pitchFamily="34" charset="0"/>
-              <a:buChar char="•"/>
-            </a:pPr>
-            <a:r>
-              <a:rPr lang="ko-KR" altLang="en-US" sz="1050" dirty="0">
-                <a:solidFill>
-                  <a:srgbClr val="78808D"/>
-                </a:solidFill>
-              </a:rPr>
-              <a:t>웹 서버와의 비동기식 통신을 위한 </a:t>
-            </a:r>
-            <a:r>
-              <a:rPr lang="en-US" altLang="ko-KR" sz="1050" b="1" dirty="0">
-                <a:solidFill>
-                  <a:srgbClr val="78808D"/>
-                </a:solidFill>
-              </a:rPr>
-              <a:t>XML Http Request</a:t>
-            </a:r>
-            <a:r>
-              <a:rPr lang="en-US" altLang="ko-KR" sz="1050" dirty="0">
-                <a:solidFill>
-                  <a:srgbClr val="78808D"/>
-                </a:solidFill>
-              </a:rPr>
-              <a:t> </a:t>
-            </a:r>
-            <a:r>
-              <a:rPr lang="ko-KR" altLang="en-US" sz="1050" dirty="0">
-                <a:solidFill>
-                  <a:srgbClr val="78808D"/>
-                </a:solidFill>
-              </a:rPr>
-              <a:t>객체</a:t>
-            </a:r>
-            <a:endParaRPr lang="en-US" altLang="ko-KR" sz="1050" dirty="0">
-              <a:solidFill>
-                <a:srgbClr val="78808D"/>
-              </a:solidFill>
-            </a:endParaRPr>
-          </a:p>
-          <a:p>
-            <a:pPr marL="171450" indent="-171450">
-              <a:lnSpc>
-                <a:spcPct val="150000"/>
-              </a:lnSpc>
-              <a:buFont typeface="Arial" panose="020B0604020202020204" pitchFamily="34" charset="0"/>
-              <a:buChar char="•"/>
-            </a:pPr>
-            <a:r>
-              <a:rPr lang="ko-KR" altLang="en-US" sz="1050" dirty="0">
-                <a:solidFill>
-                  <a:srgbClr val="78808D"/>
-                </a:solidFill>
-              </a:rPr>
-              <a:t>위에서 언급한 모든 기술을 결합하여 사용자의 작업 흐름을 제어하는데 사용되는 </a:t>
-            </a:r>
-            <a:r>
-              <a:rPr lang="ko-KR" altLang="en-US" sz="1050" b="1" dirty="0">
-                <a:solidFill>
-                  <a:srgbClr val="78808D"/>
-                </a:solidFill>
-              </a:rPr>
-              <a:t>자바스크립트</a:t>
-            </a:r>
-            <a:endParaRPr lang="en-US" altLang="ko-KR" sz="1050" b="1" dirty="0">
+              <a:rPr lang="ko-KR" altLang="en-US" sz="1200" dirty="0">
+                <a:solidFill>
+                  <a:srgbClr val="78808D"/>
+                </a:solidFill>
+              </a:rPr>
+              <a:t>병렬적으로 태스크</a:t>
+            </a:r>
+            <a:r>
+              <a:rPr lang="en-US" altLang="ko-KR" sz="1200" dirty="0">
+                <a:solidFill>
+                  <a:srgbClr val="78808D"/>
+                </a:solidFill>
+              </a:rPr>
+              <a:t>(task)</a:t>
+            </a:r>
+            <a:r>
+              <a:rPr lang="ko-KR" altLang="en-US" sz="1200" dirty="0">
+                <a:solidFill>
+                  <a:srgbClr val="78808D"/>
+                </a:solidFill>
+              </a:rPr>
+              <a:t>를 수행한다</a:t>
+            </a:r>
+            <a:r>
+              <a:rPr lang="en-US" altLang="ko-KR" sz="1200" dirty="0">
+                <a:solidFill>
+                  <a:srgbClr val="78808D"/>
+                </a:solidFill>
+              </a:rPr>
+              <a:t>.  </a:t>
+            </a:r>
+            <a:r>
+              <a:rPr lang="ko-KR" altLang="en-US" sz="1200" dirty="0">
+                <a:solidFill>
+                  <a:srgbClr val="78808D"/>
+                </a:solidFill>
+              </a:rPr>
+              <a:t>작업이 종료되지 않은 상태라 하더라도 </a:t>
+            </a:r>
+            <a:r>
+              <a:rPr lang="ko-KR" altLang="en-US" sz="1200" b="1" dirty="0">
+                <a:solidFill>
+                  <a:srgbClr val="78808D"/>
+                </a:solidFill>
+              </a:rPr>
+              <a:t>대기하지 않고 다음 작업을 실행</a:t>
+            </a:r>
+            <a:r>
+              <a:rPr lang="ko-KR" altLang="en-US" sz="1200" dirty="0">
+                <a:solidFill>
+                  <a:srgbClr val="78808D"/>
+                </a:solidFill>
+              </a:rPr>
+              <a:t>한다</a:t>
+            </a:r>
+            <a:endParaRPr lang="en-US" altLang="ko-KR" sz="1200" dirty="0">
               <a:solidFill>
                 <a:srgbClr val="78808D"/>
               </a:solidFill>
@@ -10286,106 +11896,74 @@
           </p:cNvPicPr>
           <p:nvPr/>
         </p:nvPicPr>
-        <p:blipFill>
-          <a:blip r:embed="rId2">
+        <p:blipFill rotWithShape="1">
+          <a:blip r:embed="rId2" cstate="print">
             <a:extLst>
               <a:ext uri="{28A0092B-C50C-407E-A947-70E740481C1C}">
                 <a14:useLocalDpi xmlns:a14="http://schemas.microsoft.com/office/drawing/2010/main" val="0"/>
               </a:ext>
             </a:extLst>
           </a:blip>
-          <a:stretch>
-            <a:fillRect/>
-          </a:stretch>
+          <a:srcRect l="5962" b="5962"/>
+          <a:stretch/>
         </p:blipFill>
         <p:spPr>
           <a:xfrm>
-            <a:off x="6980151" y="2499582"/>
-            <a:ext cx="4582164" cy="2486372"/>
+            <a:off x="7075503" y="2463468"/>
+            <a:ext cx="4601626" cy="2866754"/>
           </a:xfrm>
           <a:prstGeom prst="rect">
             <a:avLst/>
           </a:prstGeom>
         </p:spPr>
       </p:pic>
-      <p:sp>
-        <p:nvSpPr>
-          <p:cNvPr id="24" name="직사각형 23">
-            <a:extLst>
-              <a:ext uri="{FF2B5EF4-FFF2-40B4-BE49-F238E27FC236}">
-                <a16:creationId xmlns:a16="http://schemas.microsoft.com/office/drawing/2014/main" id="{521BC65F-9B6D-4E3B-A72B-E18FB1FB6681}"/>
-              </a:ext>
-            </a:extLst>
-          </p:cNvPr>
-          <p:cNvSpPr/>
+      <p:cxnSp>
+        <p:nvCxnSpPr>
+          <p:cNvPr id="18" name="직선 연결선 17">
+            <a:extLst>
+              <a:ext uri="{FF2B5EF4-FFF2-40B4-BE49-F238E27FC236}">
+                <a16:creationId xmlns:a16="http://schemas.microsoft.com/office/drawing/2014/main" id="{F60DD112-D6F8-40D2-B846-13A856F4C2CA}"/>
+              </a:ext>
+            </a:extLst>
+          </p:cNvPr>
+          <p:cNvCxnSpPr>
+            <a:cxnSpLocks/>
+          </p:cNvCxnSpPr>
           <p:nvPr/>
-        </p:nvSpPr>
+        </p:nvCxnSpPr>
         <p:spPr>
           <a:xfrm>
-            <a:off x="6988031" y="4985954"/>
-            <a:ext cx="4499294" cy="745318"/>
+            <a:off x="410766" y="3941685"/>
+            <a:ext cx="6057146" cy="0"/>
           </a:xfrm>
-          <a:prstGeom prst="rect">
+          <a:prstGeom prst="line">
             <a:avLst/>
           </a:prstGeom>
-          <a:noFill/>
-          <a:ln>
-            <a:noFill/>
+          <a:ln w="25400">
+            <a:solidFill>
+              <a:srgbClr val="78808D"/>
+            </a:solidFill>
           </a:ln>
         </p:spPr>
         <p:style>
-          <a:lnRef idx="2">
-            <a:schemeClr val="accent1">
-              <a:shade val="50000"/>
-            </a:schemeClr>
+          <a:lnRef idx="1">
+            <a:schemeClr val="accent1"/>
           </a:lnRef>
-          <a:fillRef idx="1">
+          <a:fillRef idx="0">
             <a:schemeClr val="accent1"/>
           </a:fillRef>
           <a:effectRef idx="0">
             <a:schemeClr val="accent1"/>
           </a:effectRef>
           <a:fontRef idx="minor">
-            <a:schemeClr val="lt1"/>
+            <a:schemeClr val="tx1"/>
           </a:fontRef>
         </p:style>
-        <p:txBody>
-          <a:bodyPr rtlCol="0" anchor="ctr"/>
-          <a:lstStyle/>
-          <a:p>
-            <a:pPr algn="ctr">
-              <a:lnSpc>
-                <a:spcPct val="150000"/>
-              </a:lnSpc>
-            </a:pPr>
-            <a:r>
-              <a:rPr lang="en-US" altLang="ko-KR" sz="1050" dirty="0">
-                <a:solidFill>
-                  <a:srgbClr val="78808D"/>
-                </a:solidFill>
-              </a:rPr>
-              <a:t>Ajax </a:t>
-            </a:r>
-            <a:r>
-              <a:rPr lang="ko-KR" altLang="en-US" sz="1050" dirty="0">
-                <a:solidFill>
-                  <a:srgbClr val="78808D"/>
-                </a:solidFill>
-              </a:rPr>
-              <a:t>동작 원리</a:t>
-            </a:r>
-            <a:endParaRPr lang="en-US" altLang="ko-KR" sz="1050" dirty="0">
-              <a:solidFill>
-                <a:srgbClr val="78808D"/>
-              </a:solidFill>
-            </a:endParaRPr>
-          </a:p>
-        </p:txBody>
-      </p:sp>
+      </p:cxnSp>
     </p:spTree>
     <p:extLst>
       <p:ext uri="{BB962C8B-B14F-4D97-AF65-F5344CB8AC3E}">
-        <p14:creationId xmlns:p14="http://schemas.microsoft.com/office/powerpoint/2010/main" val="2353219336"/>
+        <p14:creationId xmlns:p14="http://schemas.microsoft.com/office/powerpoint/2010/main" val="181271212"/>
       </p:ext>
     </p:extLst>
   </p:cSld>
@@ -10980,6 +12558,1017 @@
                   <a:srgbClr val="00B0F0"/>
                 </a:solidFill>
               </a:rPr>
+              <a:t>Ajax</a:t>
+            </a:r>
+            <a:r>
+              <a:rPr lang="en-US" altLang="ko-KR" sz="1600" b="1" dirty="0">
+                <a:solidFill>
+                  <a:srgbClr val="00B0F0"/>
+                </a:solidFill>
+              </a:rPr>
+              <a:t>(Asynchronous JavaScript and XML)</a:t>
+            </a:r>
+          </a:p>
+          <a:p>
+            <a:pPr>
+              <a:lnSpc>
+                <a:spcPct val="150000"/>
+              </a:lnSpc>
+            </a:pPr>
+            <a:endParaRPr lang="en-US" altLang="ko-KR" sz="1200" b="1" dirty="0">
+              <a:solidFill>
+                <a:srgbClr val="00B0F0"/>
+              </a:solidFill>
+            </a:endParaRPr>
+          </a:p>
+          <a:p>
+            <a:pPr>
+              <a:lnSpc>
+                <a:spcPct val="150000"/>
+              </a:lnSpc>
+            </a:pPr>
+            <a:r>
+              <a:rPr lang="en-US" altLang="ko-KR" sz="1050" b="1" dirty="0">
+                <a:solidFill>
+                  <a:srgbClr val="78808D"/>
+                </a:solidFill>
+              </a:rPr>
+              <a:t>Ajax</a:t>
+            </a:r>
+            <a:r>
+              <a:rPr lang="ko-KR" altLang="en-US" sz="1050" b="1" dirty="0">
+                <a:solidFill>
+                  <a:srgbClr val="78808D"/>
+                </a:solidFill>
+              </a:rPr>
+              <a:t>는 웹 페이지 전체를 다시 로딩 하지 않고도</a:t>
+            </a:r>
+            <a:r>
+              <a:rPr lang="en-US" altLang="ko-KR" sz="1050" b="1" dirty="0">
+                <a:solidFill>
+                  <a:srgbClr val="78808D"/>
+                </a:solidFill>
+              </a:rPr>
+              <a:t>, </a:t>
+            </a:r>
+            <a:r>
+              <a:rPr lang="ko-KR" altLang="en-US" sz="1050" b="1" dirty="0">
+                <a:solidFill>
+                  <a:srgbClr val="78808D"/>
+                </a:solidFill>
+              </a:rPr>
+              <a:t>웹 페이지의 일부분만을 갱신할 수 있도록 해주는 개발 기법이다 </a:t>
+            </a:r>
+            <a:r>
+              <a:rPr lang="ko-KR" altLang="en-US" sz="1050" dirty="0">
+                <a:solidFill>
+                  <a:srgbClr val="78808D"/>
+                </a:solidFill>
+              </a:rPr>
+              <a:t>하나의 특정한 기술을 말하는 것이 아니며</a:t>
+            </a:r>
+            <a:r>
+              <a:rPr lang="en-US" altLang="ko-KR" sz="1050" dirty="0">
+                <a:solidFill>
+                  <a:srgbClr val="78808D"/>
+                </a:solidFill>
+              </a:rPr>
+              <a:t>, </a:t>
+            </a:r>
+            <a:r>
+              <a:rPr lang="ko-KR" altLang="en-US" sz="1050" dirty="0">
+                <a:solidFill>
+                  <a:srgbClr val="78808D"/>
+                </a:solidFill>
+              </a:rPr>
+              <a:t>함께 사용하는 기술의 묶음을 지칭하는 용어이다</a:t>
+            </a:r>
+            <a:r>
+              <a:rPr lang="en-US" altLang="ko-KR" sz="1050" dirty="0">
+                <a:solidFill>
+                  <a:srgbClr val="78808D"/>
+                </a:solidFill>
+              </a:rPr>
+              <a:t>. </a:t>
+            </a:r>
+          </a:p>
+          <a:p>
+            <a:pPr>
+              <a:lnSpc>
+                <a:spcPct val="150000"/>
+              </a:lnSpc>
+            </a:pPr>
+            <a:endParaRPr lang="en-US" altLang="ko-KR" sz="1050" dirty="0">
+              <a:solidFill>
+                <a:srgbClr val="78808D"/>
+              </a:solidFill>
+            </a:endParaRPr>
+          </a:p>
+          <a:p>
+            <a:pPr>
+              <a:lnSpc>
+                <a:spcPct val="150000"/>
+              </a:lnSpc>
+            </a:pPr>
+            <a:endParaRPr lang="en-US" altLang="ko-KR" sz="1050" dirty="0">
+              <a:solidFill>
+                <a:srgbClr val="78808D"/>
+              </a:solidFill>
+            </a:endParaRPr>
+          </a:p>
+          <a:p>
+            <a:pPr marL="171450" indent="-171450">
+              <a:lnSpc>
+                <a:spcPct val="150000"/>
+              </a:lnSpc>
+              <a:buFont typeface="Arial" panose="020B0604020202020204" pitchFamily="34" charset="0"/>
+              <a:buChar char="•"/>
+            </a:pPr>
+            <a:r>
+              <a:rPr lang="ko-KR" altLang="en-US" sz="1050" dirty="0">
+                <a:solidFill>
+                  <a:srgbClr val="78808D"/>
+                </a:solidFill>
+              </a:rPr>
+              <a:t>웹 페이지의 표현을 위한 </a:t>
+            </a:r>
+            <a:r>
+              <a:rPr lang="en-US" altLang="ko-KR" sz="1050" b="1" dirty="0">
+                <a:solidFill>
+                  <a:srgbClr val="78808D"/>
+                </a:solidFill>
+              </a:rPr>
+              <a:t>HTML</a:t>
+            </a:r>
+            <a:r>
+              <a:rPr lang="ko-KR" altLang="en-US" sz="1050" dirty="0">
+                <a:solidFill>
+                  <a:srgbClr val="78808D"/>
+                </a:solidFill>
+              </a:rPr>
+              <a:t>과 </a:t>
+            </a:r>
+            <a:r>
+              <a:rPr lang="en-US" altLang="ko-KR" sz="1050" b="1" dirty="0">
+                <a:solidFill>
+                  <a:srgbClr val="78808D"/>
+                </a:solidFill>
+              </a:rPr>
+              <a:t>CSS</a:t>
+            </a:r>
+          </a:p>
+          <a:p>
+            <a:pPr marL="171450" indent="-171450">
+              <a:lnSpc>
+                <a:spcPct val="150000"/>
+              </a:lnSpc>
+              <a:buFont typeface="Arial" panose="020B0604020202020204" pitchFamily="34" charset="0"/>
+              <a:buChar char="•"/>
+            </a:pPr>
+            <a:r>
+              <a:rPr lang="ko-KR" altLang="en-US" sz="1050" dirty="0">
+                <a:solidFill>
+                  <a:srgbClr val="78808D"/>
+                </a:solidFill>
+              </a:rPr>
+              <a:t>데이터에 접근하거나 화면 구성을 동적으로 조작하기 위해 사용되는 </a:t>
+            </a:r>
+            <a:r>
+              <a:rPr lang="en-US" altLang="ko-KR" sz="1050" b="1" dirty="0">
+                <a:solidFill>
+                  <a:srgbClr val="78808D"/>
+                </a:solidFill>
+              </a:rPr>
+              <a:t>DOM</a:t>
+            </a:r>
+          </a:p>
+          <a:p>
+            <a:pPr marL="171450" indent="-171450">
+              <a:lnSpc>
+                <a:spcPct val="150000"/>
+              </a:lnSpc>
+              <a:buFont typeface="Arial" panose="020B0604020202020204" pitchFamily="34" charset="0"/>
+              <a:buChar char="•"/>
+            </a:pPr>
+            <a:r>
+              <a:rPr lang="ko-KR" altLang="en-US" sz="1050" dirty="0">
+                <a:solidFill>
+                  <a:srgbClr val="78808D"/>
+                </a:solidFill>
+              </a:rPr>
+              <a:t>데이터의 교환을 위한 </a:t>
+            </a:r>
+            <a:r>
+              <a:rPr lang="en-US" altLang="ko-KR" sz="1050" b="1" dirty="0">
+                <a:solidFill>
+                  <a:srgbClr val="78808D"/>
+                </a:solidFill>
+              </a:rPr>
+              <a:t>JSON</a:t>
+            </a:r>
+            <a:r>
+              <a:rPr lang="ko-KR" altLang="en-US" sz="1050" dirty="0">
+                <a:solidFill>
+                  <a:srgbClr val="78808D"/>
+                </a:solidFill>
+              </a:rPr>
+              <a:t>이나 </a:t>
+            </a:r>
+            <a:r>
+              <a:rPr lang="en-US" altLang="ko-KR" sz="1050" b="1" dirty="0">
+                <a:solidFill>
+                  <a:srgbClr val="78808D"/>
+                </a:solidFill>
+              </a:rPr>
+              <a:t>XML</a:t>
+            </a:r>
+          </a:p>
+          <a:p>
+            <a:pPr marL="171450" indent="-171450">
+              <a:lnSpc>
+                <a:spcPct val="150000"/>
+              </a:lnSpc>
+              <a:buFont typeface="Arial" panose="020B0604020202020204" pitchFamily="34" charset="0"/>
+              <a:buChar char="•"/>
+            </a:pPr>
+            <a:r>
+              <a:rPr lang="ko-KR" altLang="en-US" sz="1050" dirty="0">
+                <a:solidFill>
+                  <a:srgbClr val="78808D"/>
+                </a:solidFill>
+              </a:rPr>
+              <a:t>웹 서버와의 비동기식 통신을 위한 </a:t>
+            </a:r>
+            <a:r>
+              <a:rPr lang="en-US" altLang="ko-KR" sz="1050" b="1" dirty="0">
+                <a:solidFill>
+                  <a:srgbClr val="78808D"/>
+                </a:solidFill>
+              </a:rPr>
+              <a:t>XML Http Request</a:t>
+            </a:r>
+            <a:r>
+              <a:rPr lang="en-US" altLang="ko-KR" sz="1050" dirty="0">
+                <a:solidFill>
+                  <a:srgbClr val="78808D"/>
+                </a:solidFill>
+              </a:rPr>
+              <a:t> </a:t>
+            </a:r>
+            <a:r>
+              <a:rPr lang="ko-KR" altLang="en-US" sz="1050" dirty="0">
+                <a:solidFill>
+                  <a:srgbClr val="78808D"/>
+                </a:solidFill>
+              </a:rPr>
+              <a:t>객체</a:t>
+            </a:r>
+            <a:endParaRPr lang="en-US" altLang="ko-KR" sz="1050" dirty="0">
+              <a:solidFill>
+                <a:srgbClr val="78808D"/>
+              </a:solidFill>
+            </a:endParaRPr>
+          </a:p>
+          <a:p>
+            <a:pPr marL="171450" indent="-171450">
+              <a:lnSpc>
+                <a:spcPct val="150000"/>
+              </a:lnSpc>
+              <a:buFont typeface="Arial" panose="020B0604020202020204" pitchFamily="34" charset="0"/>
+              <a:buChar char="•"/>
+            </a:pPr>
+            <a:r>
+              <a:rPr lang="ko-KR" altLang="en-US" sz="1050" dirty="0">
+                <a:solidFill>
+                  <a:srgbClr val="78808D"/>
+                </a:solidFill>
+              </a:rPr>
+              <a:t>위에서 언급한 모든 기술을 결합하여 사용자의 작업 흐름을 제어하는데 사용되는 </a:t>
+            </a:r>
+            <a:r>
+              <a:rPr lang="ko-KR" altLang="en-US" sz="1050" b="1" dirty="0">
+                <a:solidFill>
+                  <a:srgbClr val="78808D"/>
+                </a:solidFill>
+              </a:rPr>
+              <a:t>자바스크립트</a:t>
+            </a:r>
+            <a:endParaRPr lang="en-US" altLang="ko-KR" sz="1050" b="1" dirty="0">
+              <a:solidFill>
+                <a:srgbClr val="78808D"/>
+              </a:solidFill>
+            </a:endParaRPr>
+          </a:p>
+        </p:txBody>
+      </p:sp>
+      <p:pic>
+        <p:nvPicPr>
+          <p:cNvPr id="22" name="그림 21">
+            <a:extLst>
+              <a:ext uri="{FF2B5EF4-FFF2-40B4-BE49-F238E27FC236}">
+                <a16:creationId xmlns:a16="http://schemas.microsoft.com/office/drawing/2014/main" id="{9A02C190-2E4F-45AD-9D43-A1F74F4AB7C4}"/>
+              </a:ext>
+            </a:extLst>
+          </p:cNvPr>
+          <p:cNvPicPr>
+            <a:picLocks noChangeAspect="1"/>
+          </p:cNvPicPr>
+          <p:nvPr/>
+        </p:nvPicPr>
+        <p:blipFill>
+          <a:blip r:embed="rId2">
+            <a:extLst>
+              <a:ext uri="{28A0092B-C50C-407E-A947-70E740481C1C}">
+                <a14:useLocalDpi xmlns:a14="http://schemas.microsoft.com/office/drawing/2010/main" val="0"/>
+              </a:ext>
+            </a:extLst>
+          </a:blip>
+          <a:stretch>
+            <a:fillRect/>
+          </a:stretch>
+        </p:blipFill>
+        <p:spPr>
+          <a:xfrm>
+            <a:off x="6980151" y="2499582"/>
+            <a:ext cx="4582164" cy="2486372"/>
+          </a:xfrm>
+          <a:prstGeom prst="rect">
+            <a:avLst/>
+          </a:prstGeom>
+        </p:spPr>
+      </p:pic>
+      <p:sp>
+        <p:nvSpPr>
+          <p:cNvPr id="24" name="직사각형 23">
+            <a:extLst>
+              <a:ext uri="{FF2B5EF4-FFF2-40B4-BE49-F238E27FC236}">
+                <a16:creationId xmlns:a16="http://schemas.microsoft.com/office/drawing/2014/main" id="{521BC65F-9B6D-4E3B-A72B-E18FB1FB6681}"/>
+              </a:ext>
+            </a:extLst>
+          </p:cNvPr>
+          <p:cNvSpPr/>
+          <p:nvPr/>
+        </p:nvSpPr>
+        <p:spPr>
+          <a:xfrm>
+            <a:off x="6988031" y="4985954"/>
+            <a:ext cx="4499294" cy="745318"/>
+          </a:xfrm>
+          <a:prstGeom prst="rect">
+            <a:avLst/>
+          </a:prstGeom>
+          <a:noFill/>
+          <a:ln>
+            <a:noFill/>
+          </a:ln>
+        </p:spPr>
+        <p:style>
+          <a:lnRef idx="2">
+            <a:schemeClr val="accent1">
+              <a:shade val="50000"/>
+            </a:schemeClr>
+          </a:lnRef>
+          <a:fillRef idx="1">
+            <a:schemeClr val="accent1"/>
+          </a:fillRef>
+          <a:effectRef idx="0">
+            <a:schemeClr val="accent1"/>
+          </a:effectRef>
+          <a:fontRef idx="minor">
+            <a:schemeClr val="lt1"/>
+          </a:fontRef>
+        </p:style>
+        <p:txBody>
+          <a:bodyPr rtlCol="0" anchor="ctr"/>
+          <a:lstStyle/>
+          <a:p>
+            <a:pPr algn="ctr">
+              <a:lnSpc>
+                <a:spcPct val="150000"/>
+              </a:lnSpc>
+            </a:pPr>
+            <a:r>
+              <a:rPr lang="en-US" altLang="ko-KR" sz="1050" dirty="0">
+                <a:solidFill>
+                  <a:srgbClr val="78808D"/>
+                </a:solidFill>
+              </a:rPr>
+              <a:t>Ajax </a:t>
+            </a:r>
+            <a:r>
+              <a:rPr lang="ko-KR" altLang="en-US" sz="1050" dirty="0">
+                <a:solidFill>
+                  <a:srgbClr val="78808D"/>
+                </a:solidFill>
+              </a:rPr>
+              <a:t>동작 원리</a:t>
+            </a:r>
+            <a:endParaRPr lang="en-US" altLang="ko-KR" sz="1050" dirty="0">
+              <a:solidFill>
+                <a:srgbClr val="78808D"/>
+              </a:solidFill>
+            </a:endParaRPr>
+          </a:p>
+        </p:txBody>
+      </p:sp>
+    </p:spTree>
+    <p:extLst>
+      <p:ext uri="{BB962C8B-B14F-4D97-AF65-F5344CB8AC3E}">
+        <p14:creationId xmlns:p14="http://schemas.microsoft.com/office/powerpoint/2010/main" val="2353219336"/>
+      </p:ext>
+    </p:extLst>
+  </p:cSld>
+  <p:clrMapOvr>
+    <a:masterClrMapping/>
+  </p:clrMapOvr>
+</p:sld>
+</file>
+
+<file path=ppt/slides/slide6.xml><?xml version="1.0" encoding="utf-8"?>
+<p:sld xmlns:a="http://schemas.openxmlformats.org/drawingml/2006/main" xmlns:r="http://schemas.openxmlformats.org/officeDocument/2006/relationships" xmlns:p="http://schemas.openxmlformats.org/presentationml/2006/main">
+  <p:cSld>
+    <p:spTree>
+      <p:nvGrpSpPr>
+        <p:cNvPr id="1" name=""/>
+        <p:cNvGrpSpPr/>
+        <p:nvPr/>
+      </p:nvGrpSpPr>
+      <p:grpSpPr>
+        <a:xfrm>
+          <a:off x="0" y="0"/>
+          <a:ext cx="0" cy="0"/>
+          <a:chOff x="0" y="0"/>
+          <a:chExt cx="0" cy="0"/>
+        </a:xfrm>
+      </p:grpSpPr>
+      <p:sp>
+        <p:nvSpPr>
+          <p:cNvPr id="12" name="사각형: 잘린 대각선 방향 모서리 11">
+            <a:extLst>
+              <a:ext uri="{FF2B5EF4-FFF2-40B4-BE49-F238E27FC236}">
+                <a16:creationId xmlns:a16="http://schemas.microsoft.com/office/drawing/2014/main" id="{E785BA1E-6CAA-4578-BD5D-D0A9DAD338DF}"/>
+              </a:ext>
+            </a:extLst>
+          </p:cNvPr>
+          <p:cNvSpPr/>
+          <p:nvPr/>
+        </p:nvSpPr>
+        <p:spPr>
+          <a:xfrm>
+            <a:off x="6761527" y="1556976"/>
+            <a:ext cx="5019413" cy="4679740"/>
+          </a:xfrm>
+          <a:prstGeom prst="snip2DiagRect">
+            <a:avLst>
+              <a:gd name="adj1" fmla="val 0"/>
+              <a:gd name="adj2" fmla="val 13442"/>
+            </a:avLst>
+          </a:prstGeom>
+          <a:solidFill>
+            <a:schemeClr val="bg1"/>
+          </a:solidFill>
+          <a:ln w="19050">
+            <a:solidFill>
+              <a:srgbClr val="214867"/>
+            </a:solidFill>
+          </a:ln>
+        </p:spPr>
+        <p:style>
+          <a:lnRef idx="2">
+            <a:schemeClr val="accent1">
+              <a:shade val="50000"/>
+            </a:schemeClr>
+          </a:lnRef>
+          <a:fillRef idx="1">
+            <a:schemeClr val="accent1"/>
+          </a:fillRef>
+          <a:effectRef idx="0">
+            <a:schemeClr val="accent1"/>
+          </a:effectRef>
+          <a:fontRef idx="minor">
+            <a:schemeClr val="lt1"/>
+          </a:fontRef>
+        </p:style>
+        <p:txBody>
+          <a:bodyPr rtlCol="0" anchor="ctr"/>
+          <a:lstStyle/>
+          <a:p>
+            <a:pPr algn="ctr"/>
+            <a:endParaRPr lang="ko-KR" altLang="en-US">
+              <a:solidFill>
+                <a:prstClr val="white"/>
+              </a:solidFill>
+            </a:endParaRPr>
+          </a:p>
+        </p:txBody>
+      </p:sp>
+      <p:sp>
+        <p:nvSpPr>
+          <p:cNvPr id="14" name="직사각형 13">
+            <a:extLst>
+              <a:ext uri="{FF2B5EF4-FFF2-40B4-BE49-F238E27FC236}">
+                <a16:creationId xmlns:a16="http://schemas.microsoft.com/office/drawing/2014/main" id="{06C33F71-FFC7-4C90-8A7A-F04FBE1B9F8D}"/>
+              </a:ext>
+            </a:extLst>
+          </p:cNvPr>
+          <p:cNvSpPr/>
+          <p:nvPr/>
+        </p:nvSpPr>
+        <p:spPr>
+          <a:xfrm>
+            <a:off x="0" y="-3"/>
+            <a:ext cx="12192000" cy="1081193"/>
+          </a:xfrm>
+          <a:prstGeom prst="rect">
+            <a:avLst/>
+          </a:prstGeom>
+          <a:solidFill>
+            <a:srgbClr val="214867"/>
+          </a:solidFill>
+          <a:ln>
+            <a:noFill/>
+          </a:ln>
+        </p:spPr>
+        <p:style>
+          <a:lnRef idx="2">
+            <a:schemeClr val="accent1">
+              <a:shade val="50000"/>
+            </a:schemeClr>
+          </a:lnRef>
+          <a:fillRef idx="1">
+            <a:schemeClr val="accent1"/>
+          </a:fillRef>
+          <a:effectRef idx="0">
+            <a:schemeClr val="accent1"/>
+          </a:effectRef>
+          <a:fontRef idx="minor">
+            <a:schemeClr val="lt1"/>
+          </a:fontRef>
+        </p:style>
+        <p:txBody>
+          <a:bodyPr rtlCol="0" anchor="t"/>
+          <a:lstStyle/>
+          <a:p>
+            <a:pPr algn="ctr" latinLnBrk="0">
+              <a:lnSpc>
+                <a:spcPct val="150000"/>
+              </a:lnSpc>
+              <a:defRPr/>
+            </a:pPr>
+            <a:r>
+              <a:rPr lang="en-US" altLang="ko-KR" sz="3200" b="1" i="1" kern="0" dirty="0">
+                <a:solidFill>
+                  <a:prstClr val="white"/>
+                </a:solidFill>
+              </a:rPr>
+              <a:t>Ajax </a:t>
+            </a:r>
+            <a:r>
+              <a:rPr lang="ko-KR" altLang="en-US" sz="3200" b="1" i="1" kern="0" dirty="0">
+                <a:solidFill>
+                  <a:prstClr val="white"/>
+                </a:solidFill>
+              </a:rPr>
+              <a:t>란</a:t>
+            </a:r>
+            <a:r>
+              <a:rPr lang="en-US" altLang="ko-KR" sz="3200" b="1" i="1" kern="0" dirty="0">
+                <a:solidFill>
+                  <a:prstClr val="white"/>
+                </a:solidFill>
+              </a:rPr>
+              <a:t> </a:t>
+            </a:r>
+          </a:p>
+          <a:p>
+            <a:pPr algn="ctr" latinLnBrk="0">
+              <a:defRPr/>
+            </a:pPr>
+            <a:r>
+              <a:rPr lang="en-US" altLang="ko-KR" sz="900" kern="0" dirty="0">
+                <a:solidFill>
+                  <a:prstClr val="white"/>
+                </a:solidFill>
+              </a:rPr>
+              <a:t>Asynchronous</a:t>
+            </a:r>
+            <a:r>
+              <a:rPr lang="ko-KR" altLang="en-US" sz="900" kern="0" dirty="0">
+                <a:solidFill>
+                  <a:prstClr val="white"/>
+                </a:solidFill>
+              </a:rPr>
+              <a:t> </a:t>
+            </a:r>
+            <a:r>
+              <a:rPr lang="en-US" altLang="ko-KR" sz="900" kern="0" dirty="0">
+                <a:solidFill>
+                  <a:prstClr val="white"/>
+                </a:solidFill>
+              </a:rPr>
+              <a:t>JavaScript</a:t>
+            </a:r>
+            <a:r>
+              <a:rPr lang="ko-KR" altLang="en-US" sz="900" kern="0" dirty="0">
+                <a:solidFill>
+                  <a:prstClr val="white"/>
+                </a:solidFill>
+              </a:rPr>
+              <a:t> </a:t>
+            </a:r>
+            <a:r>
+              <a:rPr lang="en-US" altLang="ko-KR" sz="900" kern="0" dirty="0">
+                <a:solidFill>
+                  <a:prstClr val="white"/>
+                </a:solidFill>
+              </a:rPr>
+              <a:t>and</a:t>
+            </a:r>
+            <a:r>
+              <a:rPr lang="ko-KR" altLang="en-US" sz="900" kern="0" dirty="0">
+                <a:solidFill>
+                  <a:prstClr val="white"/>
+                </a:solidFill>
+              </a:rPr>
+              <a:t> </a:t>
+            </a:r>
+            <a:r>
+              <a:rPr lang="en-US" altLang="ko-KR" sz="900" kern="0" dirty="0">
+                <a:solidFill>
+                  <a:prstClr val="white"/>
+                </a:solidFill>
+              </a:rPr>
+              <a:t>Xml</a:t>
+            </a:r>
+          </a:p>
+        </p:txBody>
+      </p:sp>
+      <p:grpSp>
+        <p:nvGrpSpPr>
+          <p:cNvPr id="15" name="그룹 14">
+            <a:extLst>
+              <a:ext uri="{FF2B5EF4-FFF2-40B4-BE49-F238E27FC236}">
+                <a16:creationId xmlns:a16="http://schemas.microsoft.com/office/drawing/2014/main" id="{01B88480-A456-4CDB-9ECA-BAC3ADFE90DA}"/>
+              </a:ext>
+            </a:extLst>
+          </p:cNvPr>
+          <p:cNvGrpSpPr/>
+          <p:nvPr/>
+        </p:nvGrpSpPr>
+        <p:grpSpPr>
+          <a:xfrm>
+            <a:off x="10027920" y="-3"/>
+            <a:ext cx="2164081" cy="1082041"/>
+            <a:chOff x="9919316" y="4585314"/>
+            <a:chExt cx="2272685" cy="1136343"/>
+          </a:xfrm>
+        </p:grpSpPr>
+        <p:sp>
+          <p:nvSpPr>
+            <p:cNvPr id="16" name="직각 삼각형 15">
+              <a:extLst>
+                <a:ext uri="{FF2B5EF4-FFF2-40B4-BE49-F238E27FC236}">
+                  <a16:creationId xmlns:a16="http://schemas.microsoft.com/office/drawing/2014/main" id="{55D11947-7A5F-49A1-B4CE-9BD12303E946}"/>
+                </a:ext>
+              </a:extLst>
+            </p:cNvPr>
+            <p:cNvSpPr/>
+            <p:nvPr/>
+          </p:nvSpPr>
+          <p:spPr>
+            <a:xfrm rot="5400000">
+              <a:off x="11055659" y="4585314"/>
+              <a:ext cx="1136342" cy="1136342"/>
+            </a:xfrm>
+            <a:prstGeom prst="rtTriangle">
+              <a:avLst/>
+            </a:prstGeom>
+            <a:solidFill>
+              <a:schemeClr val="bg1"/>
+            </a:solidFill>
+            <a:ln>
+              <a:noFill/>
+            </a:ln>
+          </p:spPr>
+          <p:style>
+            <a:lnRef idx="2">
+              <a:schemeClr val="accent1">
+                <a:shade val="50000"/>
+              </a:schemeClr>
+            </a:lnRef>
+            <a:fillRef idx="1">
+              <a:schemeClr val="accent1"/>
+            </a:fillRef>
+            <a:effectRef idx="0">
+              <a:schemeClr val="accent1"/>
+            </a:effectRef>
+            <a:fontRef idx="minor">
+              <a:schemeClr val="lt1"/>
+            </a:fontRef>
+          </p:style>
+          <p:txBody>
+            <a:bodyPr rtlCol="0" anchor="ctr"/>
+            <a:lstStyle/>
+            <a:p>
+              <a:pPr algn="ctr"/>
+              <a:endParaRPr lang="ko-KR" altLang="en-US">
+                <a:solidFill>
+                  <a:prstClr val="white"/>
+                </a:solidFill>
+              </a:endParaRPr>
+            </a:p>
+          </p:txBody>
+        </p:sp>
+        <p:sp>
+          <p:nvSpPr>
+            <p:cNvPr id="17" name="직각 삼각형 16">
+              <a:extLst>
+                <a:ext uri="{FF2B5EF4-FFF2-40B4-BE49-F238E27FC236}">
+                  <a16:creationId xmlns:a16="http://schemas.microsoft.com/office/drawing/2014/main" id="{7F68E216-A0B8-43CF-8570-8BF98D9FC025}"/>
+                </a:ext>
+              </a:extLst>
+            </p:cNvPr>
+            <p:cNvSpPr/>
+            <p:nvPr/>
+          </p:nvSpPr>
+          <p:spPr>
+            <a:xfrm rot="16200000">
+              <a:off x="9919316" y="4585315"/>
+              <a:ext cx="1136342" cy="1136342"/>
+            </a:xfrm>
+            <a:prstGeom prst="rtTriangle">
+              <a:avLst/>
+            </a:prstGeom>
+            <a:solidFill>
+              <a:srgbClr val="00B0F0"/>
+            </a:solidFill>
+            <a:ln>
+              <a:noFill/>
+            </a:ln>
+          </p:spPr>
+          <p:style>
+            <a:lnRef idx="2">
+              <a:schemeClr val="accent1">
+                <a:shade val="50000"/>
+              </a:schemeClr>
+            </a:lnRef>
+            <a:fillRef idx="1">
+              <a:schemeClr val="accent1"/>
+            </a:fillRef>
+            <a:effectRef idx="0">
+              <a:schemeClr val="accent1"/>
+            </a:effectRef>
+            <a:fontRef idx="minor">
+              <a:schemeClr val="lt1"/>
+            </a:fontRef>
+          </p:style>
+          <p:txBody>
+            <a:bodyPr rtlCol="0" anchor="ctr"/>
+            <a:lstStyle/>
+            <a:p>
+              <a:pPr algn="ctr"/>
+              <a:endParaRPr lang="ko-KR" altLang="en-US">
+                <a:solidFill>
+                  <a:prstClr val="white"/>
+                </a:solidFill>
+              </a:endParaRPr>
+            </a:p>
+          </p:txBody>
+        </p:sp>
+      </p:grpSp>
+      <p:sp>
+        <p:nvSpPr>
+          <p:cNvPr id="2" name="사각형: 잘린 대각선 방향 모서리 1">
+            <a:extLst>
+              <a:ext uri="{FF2B5EF4-FFF2-40B4-BE49-F238E27FC236}">
+                <a16:creationId xmlns:a16="http://schemas.microsoft.com/office/drawing/2014/main" id="{C262272E-A083-482D-AAA4-84DB7FAAD480}"/>
+              </a:ext>
+            </a:extLst>
+          </p:cNvPr>
+          <p:cNvSpPr/>
+          <p:nvPr/>
+        </p:nvSpPr>
+        <p:spPr>
+          <a:xfrm>
+            <a:off x="410766" y="1556976"/>
+            <a:ext cx="6057146" cy="4679740"/>
+          </a:xfrm>
+          <a:prstGeom prst="snip2DiagRect">
+            <a:avLst>
+              <a:gd name="adj1" fmla="val 0"/>
+              <a:gd name="adj2" fmla="val 13442"/>
+            </a:avLst>
+          </a:prstGeom>
+          <a:solidFill>
+            <a:schemeClr val="bg1"/>
+          </a:solidFill>
+          <a:ln w="19050">
+            <a:solidFill>
+              <a:srgbClr val="214867"/>
+            </a:solidFill>
+          </a:ln>
+        </p:spPr>
+        <p:style>
+          <a:lnRef idx="2">
+            <a:schemeClr val="accent1">
+              <a:shade val="50000"/>
+            </a:schemeClr>
+          </a:lnRef>
+          <a:fillRef idx="1">
+            <a:schemeClr val="accent1"/>
+          </a:fillRef>
+          <a:effectRef idx="0">
+            <a:schemeClr val="accent1"/>
+          </a:effectRef>
+          <a:fontRef idx="minor">
+            <a:schemeClr val="lt1"/>
+          </a:fontRef>
+        </p:style>
+        <p:txBody>
+          <a:bodyPr rtlCol="0" anchor="ctr"/>
+          <a:lstStyle/>
+          <a:p>
+            <a:pPr algn="ctr"/>
+            <a:endParaRPr lang="ko-KR" altLang="en-US">
+              <a:solidFill>
+                <a:prstClr val="white"/>
+              </a:solidFill>
+            </a:endParaRPr>
+          </a:p>
+        </p:txBody>
+      </p:sp>
+      <p:sp>
+        <p:nvSpPr>
+          <p:cNvPr id="4" name="직각 삼각형 3">
+            <a:extLst>
+              <a:ext uri="{FF2B5EF4-FFF2-40B4-BE49-F238E27FC236}">
+                <a16:creationId xmlns:a16="http://schemas.microsoft.com/office/drawing/2014/main" id="{8A08EF92-D381-4F2F-99D7-D58A7A8699D6}"/>
+              </a:ext>
+            </a:extLst>
+          </p:cNvPr>
+          <p:cNvSpPr/>
+          <p:nvPr/>
+        </p:nvSpPr>
+        <p:spPr>
+          <a:xfrm rot="10800000">
+            <a:off x="5821960" y="1556976"/>
+            <a:ext cx="645952" cy="817108"/>
+          </a:xfrm>
+          <a:prstGeom prst="rtTriangle">
+            <a:avLst/>
+          </a:prstGeom>
+          <a:solidFill>
+            <a:srgbClr val="00B0F0"/>
+          </a:solidFill>
+          <a:ln w="19050">
+            <a:solidFill>
+              <a:srgbClr val="214867"/>
+            </a:solidFill>
+          </a:ln>
+        </p:spPr>
+        <p:style>
+          <a:lnRef idx="2">
+            <a:schemeClr val="accent1">
+              <a:shade val="50000"/>
+            </a:schemeClr>
+          </a:lnRef>
+          <a:fillRef idx="1">
+            <a:schemeClr val="accent1"/>
+          </a:fillRef>
+          <a:effectRef idx="0">
+            <a:schemeClr val="accent1"/>
+          </a:effectRef>
+          <a:fontRef idx="minor">
+            <a:schemeClr val="lt1"/>
+          </a:fontRef>
+        </p:style>
+        <p:txBody>
+          <a:bodyPr rtlCol="0" anchor="ctr"/>
+          <a:lstStyle/>
+          <a:p>
+            <a:pPr algn="ctr"/>
+            <a:endParaRPr lang="ko-KR" altLang="en-US">
+              <a:solidFill>
+                <a:prstClr val="white"/>
+              </a:solidFill>
+            </a:endParaRPr>
+          </a:p>
+        </p:txBody>
+      </p:sp>
+      <p:sp>
+        <p:nvSpPr>
+          <p:cNvPr id="5" name="직각 삼각형 4">
+            <a:extLst>
+              <a:ext uri="{FF2B5EF4-FFF2-40B4-BE49-F238E27FC236}">
+                <a16:creationId xmlns:a16="http://schemas.microsoft.com/office/drawing/2014/main" id="{DFDB318C-74DC-45F7-8C78-5BEE74037100}"/>
+              </a:ext>
+            </a:extLst>
+          </p:cNvPr>
+          <p:cNvSpPr/>
+          <p:nvPr/>
+        </p:nvSpPr>
+        <p:spPr>
+          <a:xfrm>
+            <a:off x="411060" y="5419608"/>
+            <a:ext cx="645952" cy="817108"/>
+          </a:xfrm>
+          <a:prstGeom prst="rtTriangle">
+            <a:avLst/>
+          </a:prstGeom>
+          <a:solidFill>
+            <a:srgbClr val="00B0F0"/>
+          </a:solidFill>
+          <a:ln w="19050">
+            <a:solidFill>
+              <a:srgbClr val="214867"/>
+            </a:solidFill>
+          </a:ln>
+        </p:spPr>
+        <p:style>
+          <a:lnRef idx="2">
+            <a:schemeClr val="accent1">
+              <a:shade val="50000"/>
+            </a:schemeClr>
+          </a:lnRef>
+          <a:fillRef idx="1">
+            <a:schemeClr val="accent1"/>
+          </a:fillRef>
+          <a:effectRef idx="0">
+            <a:schemeClr val="accent1"/>
+          </a:effectRef>
+          <a:fontRef idx="minor">
+            <a:schemeClr val="lt1"/>
+          </a:fontRef>
+        </p:style>
+        <p:txBody>
+          <a:bodyPr rtlCol="0" anchor="ctr"/>
+          <a:lstStyle/>
+          <a:p>
+            <a:pPr algn="ctr"/>
+            <a:endParaRPr lang="ko-KR" altLang="en-US">
+              <a:solidFill>
+                <a:prstClr val="white"/>
+              </a:solidFill>
+            </a:endParaRPr>
+          </a:p>
+        </p:txBody>
+      </p:sp>
+      <p:sp>
+        <p:nvSpPr>
+          <p:cNvPr id="6" name="직사각형 5">
+            <a:extLst>
+              <a:ext uri="{FF2B5EF4-FFF2-40B4-BE49-F238E27FC236}">
+                <a16:creationId xmlns:a16="http://schemas.microsoft.com/office/drawing/2014/main" id="{97FE9B2E-01A3-4F72-84C0-D6686CD3997B}"/>
+              </a:ext>
+            </a:extLst>
+          </p:cNvPr>
+          <p:cNvSpPr/>
+          <p:nvPr/>
+        </p:nvSpPr>
+        <p:spPr>
+          <a:xfrm>
+            <a:off x="931179" y="1745069"/>
+            <a:ext cx="5301842" cy="4303553"/>
+          </a:xfrm>
+          <a:prstGeom prst="rect">
+            <a:avLst/>
+          </a:prstGeom>
+          <a:noFill/>
+          <a:ln>
+            <a:noFill/>
+          </a:ln>
+        </p:spPr>
+        <p:style>
+          <a:lnRef idx="2">
+            <a:schemeClr val="accent1">
+              <a:shade val="50000"/>
+            </a:schemeClr>
+          </a:lnRef>
+          <a:fillRef idx="1">
+            <a:schemeClr val="accent1"/>
+          </a:fillRef>
+          <a:effectRef idx="0">
+            <a:schemeClr val="accent1"/>
+          </a:effectRef>
+          <a:fontRef idx="minor">
+            <a:schemeClr val="lt1"/>
+          </a:fontRef>
+        </p:style>
+        <p:txBody>
+          <a:bodyPr rtlCol="0" anchor="ctr"/>
+          <a:lstStyle/>
+          <a:p>
+            <a:pPr>
+              <a:lnSpc>
+                <a:spcPct val="150000"/>
+              </a:lnSpc>
+            </a:pPr>
+            <a:r>
+              <a:rPr lang="en-US" altLang="ko-KR" sz="2500" b="1" dirty="0">
+                <a:solidFill>
+                  <a:srgbClr val="00B0F0"/>
+                </a:solidFill>
+              </a:rPr>
               <a:t>Ajax </a:t>
             </a:r>
             <a:r>
@@ -11623,7 +14212,7 @@
 </p:sld>
 </file>
 
-<file path=ppt/slides/slide6.xml><?xml version="1.0" encoding="utf-8"?>
+<file path=ppt/slides/slide7.xml><?xml version="1.0" encoding="utf-8"?>
 <p:sld xmlns:a="http://schemas.openxmlformats.org/drawingml/2006/main" xmlns:r="http://schemas.openxmlformats.org/officeDocument/2006/relationships" xmlns:p="http://schemas.openxmlformats.org/presentationml/2006/main">
   <p:cSld>
     <p:bg>
@@ -12385,7 +14974,7 @@
 </p:sld>
 </file>
 
-<file path=ppt/slides/slide7.xml><?xml version="1.0" encoding="utf-8"?>
+<file path=ppt/slides/slide8.xml><?xml version="1.0" encoding="utf-8"?>
 <p:sld xmlns:a="http://schemas.openxmlformats.org/drawingml/2006/main" xmlns:r="http://schemas.openxmlformats.org/officeDocument/2006/relationships" xmlns:p="http://schemas.openxmlformats.org/presentationml/2006/main">
   <p:cSld>
     <p:spTree>
@@ -13368,7 +15957,7 @@
 </p:sld>
 </file>
 
-<file path=ppt/slides/slide8.xml><?xml version="1.0" encoding="utf-8"?>
+<file path=ppt/slides/slide9.xml><?xml version="1.0" encoding="utf-8"?>
 <p:sld xmlns:a="http://schemas.openxmlformats.org/drawingml/2006/main" xmlns:r="http://schemas.openxmlformats.org/officeDocument/2006/relationships" xmlns:p="http://schemas.openxmlformats.org/presentationml/2006/main">
   <p:cSld>
     <p:spTree>
@@ -14286,854 +16875,6 @@
     <p:extLst>
       <p:ext uri="{BB962C8B-B14F-4D97-AF65-F5344CB8AC3E}">
         <p14:creationId xmlns:p14="http://schemas.microsoft.com/office/powerpoint/2010/main" val="538090070"/>
-      </p:ext>
-    </p:extLst>
-  </p:cSld>
-  <p:clrMapOvr>
-    <a:masterClrMapping/>
-  </p:clrMapOvr>
-</p:sld>
-</file>
-
-<file path=ppt/slides/slide9.xml><?xml version="1.0" encoding="utf-8"?>
-<p:sld xmlns:a="http://schemas.openxmlformats.org/drawingml/2006/main" xmlns:r="http://schemas.openxmlformats.org/officeDocument/2006/relationships" xmlns:p="http://schemas.openxmlformats.org/presentationml/2006/main">
-  <p:cSld>
-    <p:spTree>
-      <p:nvGrpSpPr>
-        <p:cNvPr id="1" name=""/>
-        <p:cNvGrpSpPr/>
-        <p:nvPr/>
-      </p:nvGrpSpPr>
-      <p:grpSpPr>
-        <a:xfrm>
-          <a:off x="0" y="0"/>
-          <a:ext cx="0" cy="0"/>
-          <a:chOff x="0" y="0"/>
-          <a:chExt cx="0" cy="0"/>
-        </a:xfrm>
-      </p:grpSpPr>
-      <p:sp>
-        <p:nvSpPr>
-          <p:cNvPr id="12" name="사각형: 잘린 대각선 방향 모서리 11">
-            <a:extLst>
-              <a:ext uri="{FF2B5EF4-FFF2-40B4-BE49-F238E27FC236}">
-                <a16:creationId xmlns:a16="http://schemas.microsoft.com/office/drawing/2014/main" id="{E785BA1E-6CAA-4578-BD5D-D0A9DAD338DF}"/>
-              </a:ext>
-            </a:extLst>
-          </p:cNvPr>
-          <p:cNvSpPr/>
-          <p:nvPr/>
-        </p:nvSpPr>
-        <p:spPr>
-          <a:xfrm>
-            <a:off x="6761527" y="1556976"/>
-            <a:ext cx="5019413" cy="4679740"/>
-          </a:xfrm>
-          <a:prstGeom prst="snip2DiagRect">
-            <a:avLst>
-              <a:gd name="adj1" fmla="val 0"/>
-              <a:gd name="adj2" fmla="val 13442"/>
-            </a:avLst>
-          </a:prstGeom>
-          <a:solidFill>
-            <a:schemeClr val="bg1"/>
-          </a:solidFill>
-          <a:ln w="19050">
-            <a:solidFill>
-              <a:srgbClr val="214867"/>
-            </a:solidFill>
-          </a:ln>
-        </p:spPr>
-        <p:style>
-          <a:lnRef idx="2">
-            <a:schemeClr val="accent1">
-              <a:shade val="50000"/>
-            </a:schemeClr>
-          </a:lnRef>
-          <a:fillRef idx="1">
-            <a:schemeClr val="accent1"/>
-          </a:fillRef>
-          <a:effectRef idx="0">
-            <a:schemeClr val="accent1"/>
-          </a:effectRef>
-          <a:fontRef idx="minor">
-            <a:schemeClr val="lt1"/>
-          </a:fontRef>
-        </p:style>
-        <p:txBody>
-          <a:bodyPr rtlCol="0" anchor="ctr"/>
-          <a:lstStyle/>
-          <a:p>
-            <a:pPr algn="ctr"/>
-            <a:endParaRPr lang="ko-KR" altLang="en-US">
-              <a:solidFill>
-                <a:prstClr val="white"/>
-              </a:solidFill>
-            </a:endParaRPr>
-          </a:p>
-        </p:txBody>
-      </p:sp>
-      <p:sp>
-        <p:nvSpPr>
-          <p:cNvPr id="14" name="직사각형 13">
-            <a:extLst>
-              <a:ext uri="{FF2B5EF4-FFF2-40B4-BE49-F238E27FC236}">
-                <a16:creationId xmlns:a16="http://schemas.microsoft.com/office/drawing/2014/main" id="{06C33F71-FFC7-4C90-8A7A-F04FBE1B9F8D}"/>
-              </a:ext>
-            </a:extLst>
-          </p:cNvPr>
-          <p:cNvSpPr/>
-          <p:nvPr/>
-        </p:nvSpPr>
-        <p:spPr>
-          <a:xfrm>
-            <a:off x="0" y="-3"/>
-            <a:ext cx="12192000" cy="1081193"/>
-          </a:xfrm>
-          <a:prstGeom prst="rect">
-            <a:avLst/>
-          </a:prstGeom>
-          <a:solidFill>
-            <a:srgbClr val="214867"/>
-          </a:solidFill>
-          <a:ln>
-            <a:noFill/>
-          </a:ln>
-        </p:spPr>
-        <p:style>
-          <a:lnRef idx="2">
-            <a:schemeClr val="accent1">
-              <a:shade val="50000"/>
-            </a:schemeClr>
-          </a:lnRef>
-          <a:fillRef idx="1">
-            <a:schemeClr val="accent1"/>
-          </a:fillRef>
-          <a:effectRef idx="0">
-            <a:schemeClr val="accent1"/>
-          </a:effectRef>
-          <a:fontRef idx="minor">
-            <a:schemeClr val="lt1"/>
-          </a:fontRef>
-        </p:style>
-        <p:txBody>
-          <a:bodyPr rtlCol="0" anchor="t"/>
-          <a:lstStyle/>
-          <a:p>
-            <a:pPr algn="ctr" latinLnBrk="0">
-              <a:lnSpc>
-                <a:spcPct val="150000"/>
-              </a:lnSpc>
-              <a:defRPr/>
-            </a:pPr>
-            <a:r>
-              <a:rPr lang="en-US" altLang="ko-KR" sz="3200" b="1" i="1" kern="0" dirty="0">
-                <a:solidFill>
-                  <a:prstClr val="white"/>
-                </a:solidFill>
-              </a:rPr>
-              <a:t>Git</a:t>
-            </a:r>
-            <a:r>
-              <a:rPr lang="ko-KR" altLang="en-US" sz="3200" b="1" i="1" kern="0" dirty="0">
-                <a:solidFill>
-                  <a:prstClr val="white"/>
-                </a:solidFill>
-              </a:rPr>
-              <a:t>의 구조</a:t>
-            </a:r>
-            <a:r>
-              <a:rPr lang="en-US" altLang="ko-KR" sz="3200" b="1" i="1" kern="0" dirty="0">
-                <a:solidFill>
-                  <a:prstClr val="white"/>
-                </a:solidFill>
-              </a:rPr>
-              <a:t> </a:t>
-            </a:r>
-          </a:p>
-          <a:p>
-            <a:pPr algn="ctr" latinLnBrk="0">
-              <a:defRPr/>
-            </a:pPr>
-            <a:r>
-              <a:rPr lang="ko-KR" altLang="en-US" sz="900" kern="0" dirty="0">
-                <a:solidFill>
-                  <a:prstClr val="white"/>
-                </a:solidFill>
-              </a:rPr>
-              <a:t>형상 관리 도구</a:t>
-            </a:r>
-            <a:endParaRPr lang="en-US" altLang="ko-KR" sz="900" kern="0" dirty="0">
-              <a:solidFill>
-                <a:prstClr val="white"/>
-              </a:solidFill>
-            </a:endParaRPr>
-          </a:p>
-        </p:txBody>
-      </p:sp>
-      <p:grpSp>
-        <p:nvGrpSpPr>
-          <p:cNvPr id="15" name="그룹 14">
-            <a:extLst>
-              <a:ext uri="{FF2B5EF4-FFF2-40B4-BE49-F238E27FC236}">
-                <a16:creationId xmlns:a16="http://schemas.microsoft.com/office/drawing/2014/main" id="{01B88480-A456-4CDB-9ECA-BAC3ADFE90DA}"/>
-              </a:ext>
-            </a:extLst>
-          </p:cNvPr>
-          <p:cNvGrpSpPr/>
-          <p:nvPr/>
-        </p:nvGrpSpPr>
-        <p:grpSpPr>
-          <a:xfrm>
-            <a:off x="10027920" y="-3"/>
-            <a:ext cx="2164081" cy="1082041"/>
-            <a:chOff x="9919316" y="4585314"/>
-            <a:chExt cx="2272685" cy="1136343"/>
-          </a:xfrm>
-        </p:grpSpPr>
-        <p:sp>
-          <p:nvSpPr>
-            <p:cNvPr id="16" name="직각 삼각형 15">
-              <a:extLst>
-                <a:ext uri="{FF2B5EF4-FFF2-40B4-BE49-F238E27FC236}">
-                  <a16:creationId xmlns:a16="http://schemas.microsoft.com/office/drawing/2014/main" id="{55D11947-7A5F-49A1-B4CE-9BD12303E946}"/>
-                </a:ext>
-              </a:extLst>
-            </p:cNvPr>
-            <p:cNvSpPr/>
-            <p:nvPr/>
-          </p:nvSpPr>
-          <p:spPr>
-            <a:xfrm rot="5400000">
-              <a:off x="11055659" y="4585314"/>
-              <a:ext cx="1136342" cy="1136342"/>
-            </a:xfrm>
-            <a:prstGeom prst="rtTriangle">
-              <a:avLst/>
-            </a:prstGeom>
-            <a:solidFill>
-              <a:schemeClr val="bg1"/>
-            </a:solidFill>
-            <a:ln>
-              <a:noFill/>
-            </a:ln>
-          </p:spPr>
-          <p:style>
-            <a:lnRef idx="2">
-              <a:schemeClr val="accent1">
-                <a:shade val="50000"/>
-              </a:schemeClr>
-            </a:lnRef>
-            <a:fillRef idx="1">
-              <a:schemeClr val="accent1"/>
-            </a:fillRef>
-            <a:effectRef idx="0">
-              <a:schemeClr val="accent1"/>
-            </a:effectRef>
-            <a:fontRef idx="minor">
-              <a:schemeClr val="lt1"/>
-            </a:fontRef>
-          </p:style>
-          <p:txBody>
-            <a:bodyPr rtlCol="0" anchor="ctr"/>
-            <a:lstStyle/>
-            <a:p>
-              <a:pPr algn="ctr"/>
-              <a:endParaRPr lang="ko-KR" altLang="en-US">
-                <a:solidFill>
-                  <a:prstClr val="white"/>
-                </a:solidFill>
-              </a:endParaRPr>
-            </a:p>
-          </p:txBody>
-        </p:sp>
-        <p:sp>
-          <p:nvSpPr>
-            <p:cNvPr id="17" name="직각 삼각형 16">
-              <a:extLst>
-                <a:ext uri="{FF2B5EF4-FFF2-40B4-BE49-F238E27FC236}">
-                  <a16:creationId xmlns:a16="http://schemas.microsoft.com/office/drawing/2014/main" id="{7F68E216-A0B8-43CF-8570-8BF98D9FC025}"/>
-                </a:ext>
-              </a:extLst>
-            </p:cNvPr>
-            <p:cNvSpPr/>
-            <p:nvPr/>
-          </p:nvSpPr>
-          <p:spPr>
-            <a:xfrm rot="16200000">
-              <a:off x="9919316" y="4585315"/>
-              <a:ext cx="1136342" cy="1136342"/>
-            </a:xfrm>
-            <a:prstGeom prst="rtTriangle">
-              <a:avLst/>
-            </a:prstGeom>
-            <a:solidFill>
-              <a:srgbClr val="00B0F0"/>
-            </a:solidFill>
-            <a:ln>
-              <a:noFill/>
-            </a:ln>
-          </p:spPr>
-          <p:style>
-            <a:lnRef idx="2">
-              <a:schemeClr val="accent1">
-                <a:shade val="50000"/>
-              </a:schemeClr>
-            </a:lnRef>
-            <a:fillRef idx="1">
-              <a:schemeClr val="accent1"/>
-            </a:fillRef>
-            <a:effectRef idx="0">
-              <a:schemeClr val="accent1"/>
-            </a:effectRef>
-            <a:fontRef idx="minor">
-              <a:schemeClr val="lt1"/>
-            </a:fontRef>
-          </p:style>
-          <p:txBody>
-            <a:bodyPr rtlCol="0" anchor="ctr"/>
-            <a:lstStyle/>
-            <a:p>
-              <a:pPr algn="ctr"/>
-              <a:endParaRPr lang="ko-KR" altLang="en-US">
-                <a:solidFill>
-                  <a:prstClr val="white"/>
-                </a:solidFill>
-              </a:endParaRPr>
-            </a:p>
-          </p:txBody>
-        </p:sp>
-      </p:grpSp>
-      <p:sp>
-        <p:nvSpPr>
-          <p:cNvPr id="2" name="사각형: 잘린 대각선 방향 모서리 1">
-            <a:extLst>
-              <a:ext uri="{FF2B5EF4-FFF2-40B4-BE49-F238E27FC236}">
-                <a16:creationId xmlns:a16="http://schemas.microsoft.com/office/drawing/2014/main" id="{C262272E-A083-482D-AAA4-84DB7FAAD480}"/>
-              </a:ext>
-            </a:extLst>
-          </p:cNvPr>
-          <p:cNvSpPr/>
-          <p:nvPr/>
-        </p:nvSpPr>
-        <p:spPr>
-          <a:xfrm>
-            <a:off x="410766" y="1556976"/>
-            <a:ext cx="6057146" cy="4679740"/>
-          </a:xfrm>
-          <a:prstGeom prst="snip2DiagRect">
-            <a:avLst>
-              <a:gd name="adj1" fmla="val 0"/>
-              <a:gd name="adj2" fmla="val 13442"/>
-            </a:avLst>
-          </a:prstGeom>
-          <a:solidFill>
-            <a:schemeClr val="bg1"/>
-          </a:solidFill>
-          <a:ln w="19050">
-            <a:solidFill>
-              <a:srgbClr val="214867"/>
-            </a:solidFill>
-          </a:ln>
-        </p:spPr>
-        <p:style>
-          <a:lnRef idx="2">
-            <a:schemeClr val="accent1">
-              <a:shade val="50000"/>
-            </a:schemeClr>
-          </a:lnRef>
-          <a:fillRef idx="1">
-            <a:schemeClr val="accent1"/>
-          </a:fillRef>
-          <a:effectRef idx="0">
-            <a:schemeClr val="accent1"/>
-          </a:effectRef>
-          <a:fontRef idx="minor">
-            <a:schemeClr val="lt1"/>
-          </a:fontRef>
-        </p:style>
-        <p:txBody>
-          <a:bodyPr rtlCol="0" anchor="ctr"/>
-          <a:lstStyle/>
-          <a:p>
-            <a:pPr algn="ctr"/>
-            <a:endParaRPr lang="ko-KR" altLang="en-US">
-              <a:solidFill>
-                <a:prstClr val="white"/>
-              </a:solidFill>
-            </a:endParaRPr>
-          </a:p>
-        </p:txBody>
-      </p:sp>
-      <p:sp>
-        <p:nvSpPr>
-          <p:cNvPr id="4" name="직각 삼각형 3">
-            <a:extLst>
-              <a:ext uri="{FF2B5EF4-FFF2-40B4-BE49-F238E27FC236}">
-                <a16:creationId xmlns:a16="http://schemas.microsoft.com/office/drawing/2014/main" id="{8A08EF92-D381-4F2F-99D7-D58A7A8699D6}"/>
-              </a:ext>
-            </a:extLst>
-          </p:cNvPr>
-          <p:cNvSpPr/>
-          <p:nvPr/>
-        </p:nvSpPr>
-        <p:spPr>
-          <a:xfrm rot="10800000">
-            <a:off x="5821960" y="1556976"/>
-            <a:ext cx="645952" cy="817108"/>
-          </a:xfrm>
-          <a:prstGeom prst="rtTriangle">
-            <a:avLst/>
-          </a:prstGeom>
-          <a:solidFill>
-            <a:srgbClr val="00B0F0"/>
-          </a:solidFill>
-          <a:ln w="19050">
-            <a:solidFill>
-              <a:srgbClr val="214867"/>
-            </a:solidFill>
-          </a:ln>
-        </p:spPr>
-        <p:style>
-          <a:lnRef idx="2">
-            <a:schemeClr val="accent1">
-              <a:shade val="50000"/>
-            </a:schemeClr>
-          </a:lnRef>
-          <a:fillRef idx="1">
-            <a:schemeClr val="accent1"/>
-          </a:fillRef>
-          <a:effectRef idx="0">
-            <a:schemeClr val="accent1"/>
-          </a:effectRef>
-          <a:fontRef idx="minor">
-            <a:schemeClr val="lt1"/>
-          </a:fontRef>
-        </p:style>
-        <p:txBody>
-          <a:bodyPr rtlCol="0" anchor="ctr"/>
-          <a:lstStyle/>
-          <a:p>
-            <a:pPr algn="ctr"/>
-            <a:endParaRPr lang="ko-KR" altLang="en-US">
-              <a:solidFill>
-                <a:prstClr val="white"/>
-              </a:solidFill>
-            </a:endParaRPr>
-          </a:p>
-        </p:txBody>
-      </p:sp>
-      <p:sp>
-        <p:nvSpPr>
-          <p:cNvPr id="5" name="직각 삼각형 4">
-            <a:extLst>
-              <a:ext uri="{FF2B5EF4-FFF2-40B4-BE49-F238E27FC236}">
-                <a16:creationId xmlns:a16="http://schemas.microsoft.com/office/drawing/2014/main" id="{DFDB318C-74DC-45F7-8C78-5BEE74037100}"/>
-              </a:ext>
-            </a:extLst>
-          </p:cNvPr>
-          <p:cNvSpPr/>
-          <p:nvPr/>
-        </p:nvSpPr>
-        <p:spPr>
-          <a:xfrm>
-            <a:off x="411060" y="5419608"/>
-            <a:ext cx="645952" cy="817108"/>
-          </a:xfrm>
-          <a:prstGeom prst="rtTriangle">
-            <a:avLst/>
-          </a:prstGeom>
-          <a:solidFill>
-            <a:srgbClr val="00B0F0"/>
-          </a:solidFill>
-          <a:ln w="19050">
-            <a:solidFill>
-              <a:srgbClr val="214867"/>
-            </a:solidFill>
-          </a:ln>
-        </p:spPr>
-        <p:style>
-          <a:lnRef idx="2">
-            <a:schemeClr val="accent1">
-              <a:shade val="50000"/>
-            </a:schemeClr>
-          </a:lnRef>
-          <a:fillRef idx="1">
-            <a:schemeClr val="accent1"/>
-          </a:fillRef>
-          <a:effectRef idx="0">
-            <a:schemeClr val="accent1"/>
-          </a:effectRef>
-          <a:fontRef idx="minor">
-            <a:schemeClr val="lt1"/>
-          </a:fontRef>
-        </p:style>
-        <p:txBody>
-          <a:bodyPr rtlCol="0" anchor="ctr"/>
-          <a:lstStyle/>
-          <a:p>
-            <a:pPr algn="ctr"/>
-            <a:endParaRPr lang="ko-KR" altLang="en-US">
-              <a:solidFill>
-                <a:prstClr val="white"/>
-              </a:solidFill>
-            </a:endParaRPr>
-          </a:p>
-        </p:txBody>
-      </p:sp>
-      <p:sp>
-        <p:nvSpPr>
-          <p:cNvPr id="6" name="직사각형 5">
-            <a:extLst>
-              <a:ext uri="{FF2B5EF4-FFF2-40B4-BE49-F238E27FC236}">
-                <a16:creationId xmlns:a16="http://schemas.microsoft.com/office/drawing/2014/main" id="{97FE9B2E-01A3-4F72-84C0-D6686CD3997B}"/>
-              </a:ext>
-            </a:extLst>
-          </p:cNvPr>
-          <p:cNvSpPr/>
-          <p:nvPr/>
-        </p:nvSpPr>
-        <p:spPr>
-          <a:xfrm>
-            <a:off x="931179" y="1745069"/>
-            <a:ext cx="5301842" cy="4303553"/>
-          </a:xfrm>
-          <a:prstGeom prst="rect">
-            <a:avLst/>
-          </a:prstGeom>
-          <a:noFill/>
-          <a:ln>
-            <a:noFill/>
-          </a:ln>
-        </p:spPr>
-        <p:style>
-          <a:lnRef idx="2">
-            <a:schemeClr val="accent1">
-              <a:shade val="50000"/>
-            </a:schemeClr>
-          </a:lnRef>
-          <a:fillRef idx="1">
-            <a:schemeClr val="accent1"/>
-          </a:fillRef>
-          <a:effectRef idx="0">
-            <a:schemeClr val="accent1"/>
-          </a:effectRef>
-          <a:fontRef idx="minor">
-            <a:schemeClr val="lt1"/>
-          </a:fontRef>
-        </p:style>
-        <p:txBody>
-          <a:bodyPr rtlCol="0" anchor="ctr"/>
-          <a:lstStyle/>
-          <a:p>
-            <a:pPr>
-              <a:lnSpc>
-                <a:spcPct val="150000"/>
-              </a:lnSpc>
-            </a:pPr>
-            <a:r>
-              <a:rPr lang="en-US" altLang="ko-KR" sz="2500" b="1" dirty="0">
-                <a:solidFill>
-                  <a:srgbClr val="00B0F0"/>
-                </a:solidFill>
-              </a:rPr>
-              <a:t>Git</a:t>
-            </a:r>
-            <a:r>
-              <a:rPr lang="ko-KR" altLang="en-US" sz="2000" b="1" dirty="0">
-                <a:solidFill>
-                  <a:srgbClr val="00B0F0"/>
-                </a:solidFill>
-              </a:rPr>
-              <a:t> 두개의 저장소</a:t>
-            </a:r>
-            <a:endParaRPr lang="en-US" altLang="ko-KR" sz="2000" b="1" dirty="0">
-              <a:solidFill>
-                <a:srgbClr val="00B0F0"/>
-              </a:solidFill>
-            </a:endParaRPr>
-          </a:p>
-          <a:p>
-            <a:pPr>
-              <a:lnSpc>
-                <a:spcPct val="150000"/>
-              </a:lnSpc>
-            </a:pPr>
-            <a:endParaRPr lang="en-US" altLang="ko-KR" sz="2000" dirty="0">
-              <a:solidFill>
-                <a:srgbClr val="78808D"/>
-              </a:solidFill>
-            </a:endParaRPr>
-          </a:p>
-          <a:p>
-            <a:pPr>
-              <a:lnSpc>
-                <a:spcPct val="150000"/>
-              </a:lnSpc>
-            </a:pPr>
-            <a:r>
-              <a:rPr lang="en-US" altLang="ko-KR" sz="1400" dirty="0">
-                <a:solidFill>
-                  <a:srgbClr val="78808D"/>
-                </a:solidFill>
-              </a:rPr>
-              <a:t>Git</a:t>
-            </a:r>
-            <a:r>
-              <a:rPr lang="ko-KR" altLang="en-US" sz="1400" dirty="0">
-                <a:solidFill>
-                  <a:srgbClr val="78808D"/>
-                </a:solidFill>
-              </a:rPr>
-              <a:t>의 저장소</a:t>
-            </a:r>
-            <a:r>
-              <a:rPr lang="en-US" altLang="ko-KR" sz="1400" dirty="0">
-                <a:solidFill>
-                  <a:srgbClr val="78808D"/>
-                </a:solidFill>
-              </a:rPr>
-              <a:t>(repository)</a:t>
-            </a:r>
-            <a:r>
-              <a:rPr lang="ko-KR" altLang="en-US" sz="1400" dirty="0">
-                <a:solidFill>
-                  <a:srgbClr val="78808D"/>
-                </a:solidFill>
-              </a:rPr>
-              <a:t>는 크게 </a:t>
-            </a:r>
-            <a:r>
-              <a:rPr lang="en-US" altLang="ko-KR" sz="1400" b="1" dirty="0">
-                <a:solidFill>
-                  <a:srgbClr val="78808D"/>
-                </a:solidFill>
-              </a:rPr>
-              <a:t>Local repositor</a:t>
-            </a:r>
-            <a:r>
-              <a:rPr lang="ko-KR" altLang="en-US" sz="1400" dirty="0">
-                <a:solidFill>
-                  <a:srgbClr val="78808D"/>
-                </a:solidFill>
-              </a:rPr>
-              <a:t>와</a:t>
-            </a:r>
-            <a:r>
-              <a:rPr lang="ko-KR" altLang="en-US" sz="1400" b="1" dirty="0">
-                <a:solidFill>
-                  <a:srgbClr val="78808D"/>
-                </a:solidFill>
-              </a:rPr>
-              <a:t> </a:t>
-            </a:r>
-            <a:endParaRPr lang="en-US" altLang="ko-KR" sz="1400" b="1" dirty="0">
-              <a:solidFill>
-                <a:srgbClr val="78808D"/>
-              </a:solidFill>
-            </a:endParaRPr>
-          </a:p>
-          <a:p>
-            <a:pPr>
-              <a:lnSpc>
-                <a:spcPct val="150000"/>
-              </a:lnSpc>
-            </a:pPr>
-            <a:r>
-              <a:rPr lang="en-US" altLang="ko-KR" sz="1400" b="1" dirty="0">
-                <a:solidFill>
-                  <a:srgbClr val="78808D"/>
-                </a:solidFill>
-              </a:rPr>
-              <a:t>Remote repositor</a:t>
-            </a:r>
-            <a:r>
-              <a:rPr lang="ko-KR" altLang="en-US" sz="1400" dirty="0">
-                <a:solidFill>
-                  <a:srgbClr val="78808D"/>
-                </a:solidFill>
-              </a:rPr>
-              <a:t>가 있다</a:t>
-            </a:r>
-            <a:endParaRPr lang="en-US" altLang="ko-KR" sz="1200" b="1" dirty="0">
-              <a:solidFill>
-                <a:srgbClr val="78808D"/>
-              </a:solidFill>
-            </a:endParaRPr>
-          </a:p>
-          <a:p>
-            <a:pPr>
-              <a:lnSpc>
-                <a:spcPct val="150000"/>
-              </a:lnSpc>
-            </a:pPr>
-            <a:endParaRPr lang="en-US" altLang="ko-KR" sz="1200" b="1" dirty="0">
-              <a:solidFill>
-                <a:srgbClr val="78808D"/>
-              </a:solidFill>
-            </a:endParaRPr>
-          </a:p>
-          <a:p>
-            <a:pPr marL="171450" indent="-171450">
-              <a:lnSpc>
-                <a:spcPct val="150000"/>
-              </a:lnSpc>
-              <a:buFont typeface="Arial" panose="020B0604020202020204" pitchFamily="34" charset="0"/>
-              <a:buChar char="•"/>
-            </a:pPr>
-            <a:r>
-              <a:rPr lang="en-US" altLang="ko-KR" sz="1200" dirty="0">
-                <a:solidFill>
-                  <a:srgbClr val="78808D"/>
-                </a:solidFill>
-              </a:rPr>
-              <a:t>Local repository : </a:t>
-            </a:r>
-            <a:r>
-              <a:rPr lang="ko-KR" altLang="en-US" sz="1200" dirty="0">
-                <a:solidFill>
-                  <a:srgbClr val="78808D"/>
-                </a:solidFill>
-              </a:rPr>
-              <a:t>개인 </a:t>
-            </a:r>
-            <a:r>
-              <a:rPr lang="en-US" altLang="ko-KR" sz="1200" dirty="0">
-                <a:solidFill>
-                  <a:srgbClr val="78808D"/>
-                </a:solidFill>
-              </a:rPr>
-              <a:t>PC</a:t>
-            </a:r>
-            <a:r>
-              <a:rPr lang="ko-KR" altLang="en-US" sz="1200" dirty="0">
-                <a:solidFill>
-                  <a:srgbClr val="78808D"/>
-                </a:solidFill>
-              </a:rPr>
-              <a:t>에 설정된 </a:t>
-            </a:r>
-            <a:r>
-              <a:rPr lang="en-US" altLang="ko-KR" sz="1200" dirty="0">
-                <a:solidFill>
-                  <a:srgbClr val="78808D"/>
-                </a:solidFill>
-              </a:rPr>
-              <a:t>Git repository</a:t>
-            </a:r>
-          </a:p>
-          <a:p>
-            <a:pPr>
-              <a:lnSpc>
-                <a:spcPct val="150000"/>
-              </a:lnSpc>
-            </a:pPr>
-            <a:endParaRPr lang="en-US" altLang="ko-KR" sz="1200" dirty="0">
-              <a:solidFill>
-                <a:srgbClr val="78808D"/>
-              </a:solidFill>
-            </a:endParaRPr>
-          </a:p>
-          <a:p>
-            <a:pPr marL="171450" indent="-171450">
-              <a:lnSpc>
-                <a:spcPct val="150000"/>
-              </a:lnSpc>
-              <a:buFont typeface="Arial" panose="020B0604020202020204" pitchFamily="34" charset="0"/>
-              <a:buChar char="•"/>
-            </a:pPr>
-            <a:r>
-              <a:rPr lang="en-US" altLang="ko-KR" sz="1200" dirty="0">
-                <a:solidFill>
-                  <a:srgbClr val="78808D"/>
-                </a:solidFill>
-              </a:rPr>
-              <a:t>Remote repository : remote repository</a:t>
-            </a:r>
-            <a:r>
-              <a:rPr lang="ko-KR" altLang="en-US" sz="1200" dirty="0">
-                <a:solidFill>
-                  <a:srgbClr val="78808D"/>
-                </a:solidFill>
-              </a:rPr>
-              <a:t>를 운용하는 서버에 있는 </a:t>
-            </a:r>
-            <a:r>
-              <a:rPr lang="en-US" altLang="ko-KR" sz="1200" dirty="0">
-                <a:solidFill>
-                  <a:srgbClr val="78808D"/>
-                </a:solidFill>
-              </a:rPr>
-              <a:t>Git repository</a:t>
-            </a:r>
-            <a:r>
-              <a:rPr lang="ko-KR" altLang="en-US" sz="1200" dirty="0">
-                <a:solidFill>
-                  <a:srgbClr val="78808D"/>
-                </a:solidFill>
-              </a:rPr>
-              <a:t>로 일종의 백업 클라우드 개념이다</a:t>
-            </a:r>
-            <a:endParaRPr lang="en-US" altLang="ko-KR" sz="1200" dirty="0">
-              <a:solidFill>
-                <a:srgbClr val="78808D"/>
-              </a:solidFill>
-            </a:endParaRPr>
-          </a:p>
-          <a:p>
-            <a:pPr>
-              <a:lnSpc>
-                <a:spcPct val="150000"/>
-              </a:lnSpc>
-            </a:pPr>
-            <a:endParaRPr lang="en-US" altLang="ko-KR" sz="1200" b="1" dirty="0">
-              <a:solidFill>
-                <a:srgbClr val="78808D"/>
-              </a:solidFill>
-            </a:endParaRPr>
-          </a:p>
-        </p:txBody>
-      </p:sp>
-      <p:pic>
-        <p:nvPicPr>
-          <p:cNvPr id="11" name="그림 10">
-            <a:extLst>
-              <a:ext uri="{FF2B5EF4-FFF2-40B4-BE49-F238E27FC236}">
-                <a16:creationId xmlns:a16="http://schemas.microsoft.com/office/drawing/2014/main" id="{5AE69E45-969B-460E-9DC7-C80CCFE2E24B}"/>
-              </a:ext>
-            </a:extLst>
-          </p:cNvPr>
-          <p:cNvPicPr>
-            <a:picLocks noChangeAspect="1"/>
-          </p:cNvPicPr>
-          <p:nvPr/>
-        </p:nvPicPr>
-        <p:blipFill>
-          <a:blip r:embed="rId2">
-            <a:extLst>
-              <a:ext uri="{28A0092B-C50C-407E-A947-70E740481C1C}">
-                <a14:useLocalDpi xmlns:a14="http://schemas.microsoft.com/office/drawing/2010/main" val="0"/>
-              </a:ext>
-            </a:extLst>
-          </a:blip>
-          <a:stretch>
-            <a:fillRect/>
-          </a:stretch>
-        </p:blipFill>
-        <p:spPr>
-          <a:xfrm>
-            <a:off x="6965962" y="2181660"/>
-            <a:ext cx="4610542" cy="3430369"/>
-          </a:xfrm>
-          <a:prstGeom prst="rect">
-            <a:avLst/>
-          </a:prstGeom>
-        </p:spPr>
-      </p:pic>
-    </p:spTree>
-    <p:extLst>
-      <p:ext uri="{BB962C8B-B14F-4D97-AF65-F5344CB8AC3E}">
-        <p14:creationId xmlns:p14="http://schemas.microsoft.com/office/powerpoint/2010/main" val="3245043748"/>
       </p:ext>
     </p:extLst>
   </p:cSld>

</xml_diff>